<commit_message>
Changed some stuff on the section 4 of the RE. Added more information to the ppt.
</commit_message>
<xml_diff>
--- a/specifications/deliv1/SOS Deliverable 1 Presentation.pptx
+++ b/specifications/deliv1/SOS Deliverable 1 Presentation.pptx
@@ -118,6 +118,11 @@
       </a:defRPr>
     </a:lvl9pPr>
   </p:defaultTextStyle>
+  <p:extLst>
+    <p:ext uri="{EFAFB233-063F-42B5-8137-9DF3F51BA10A}">
+      <p15:sldGuideLst xmlns:p15="http://schemas.microsoft.com/office/powerpoint/2012/main"/>
+    </p:ext>
+  </p:extLst>
 </p:presentation>
 </file>
 
@@ -268,7 +273,7 @@
           <a:p>
             <a:fld id="{B673521E-B280-4C28-8ED0-E34914655C34}" type="datetimeFigureOut">
               <a:rPr lang="en-US" smtClean="0"/>
-              <a:t>9/28/2019</a:t>
+              <a:t>9/29/2019</a:t>
             </a:fld>
             <a:endParaRPr lang="en-US"/>
           </a:p>
@@ -466,7 +471,7 @@
           <a:p>
             <a:fld id="{B673521E-B280-4C28-8ED0-E34914655C34}" type="datetimeFigureOut">
               <a:rPr lang="en-US" smtClean="0"/>
-              <a:t>9/28/2019</a:t>
+              <a:t>9/29/2019</a:t>
             </a:fld>
             <a:endParaRPr lang="en-US"/>
           </a:p>
@@ -674,7 +679,7 @@
           <a:p>
             <a:fld id="{B673521E-B280-4C28-8ED0-E34914655C34}" type="datetimeFigureOut">
               <a:rPr lang="en-US" smtClean="0"/>
-              <a:t>9/28/2019</a:t>
+              <a:t>9/29/2019</a:t>
             </a:fld>
             <a:endParaRPr lang="en-US"/>
           </a:p>
@@ -872,7 +877,7 @@
           <a:p>
             <a:fld id="{B673521E-B280-4C28-8ED0-E34914655C34}" type="datetimeFigureOut">
               <a:rPr lang="en-US" smtClean="0"/>
-              <a:t>9/28/2019</a:t>
+              <a:t>9/29/2019</a:t>
             </a:fld>
             <a:endParaRPr lang="en-US"/>
           </a:p>
@@ -1147,7 +1152,7 @@
           <a:p>
             <a:fld id="{B673521E-B280-4C28-8ED0-E34914655C34}" type="datetimeFigureOut">
               <a:rPr lang="en-US" smtClean="0"/>
-              <a:t>9/28/2019</a:t>
+              <a:t>9/29/2019</a:t>
             </a:fld>
             <a:endParaRPr lang="en-US"/>
           </a:p>
@@ -1412,7 +1417,7 @@
           <a:p>
             <a:fld id="{B673521E-B280-4C28-8ED0-E34914655C34}" type="datetimeFigureOut">
               <a:rPr lang="en-US" smtClean="0"/>
-              <a:t>9/28/2019</a:t>
+              <a:t>9/29/2019</a:t>
             </a:fld>
             <a:endParaRPr lang="en-US"/>
           </a:p>
@@ -1824,7 +1829,7 @@
           <a:p>
             <a:fld id="{B673521E-B280-4C28-8ED0-E34914655C34}" type="datetimeFigureOut">
               <a:rPr lang="en-US" smtClean="0"/>
-              <a:t>9/28/2019</a:t>
+              <a:t>9/29/2019</a:t>
             </a:fld>
             <a:endParaRPr lang="en-US"/>
           </a:p>
@@ -1965,7 +1970,7 @@
           <a:p>
             <a:fld id="{B673521E-B280-4C28-8ED0-E34914655C34}" type="datetimeFigureOut">
               <a:rPr lang="en-US" smtClean="0"/>
-              <a:t>9/28/2019</a:t>
+              <a:t>9/29/2019</a:t>
             </a:fld>
             <a:endParaRPr lang="en-US"/>
           </a:p>
@@ -2078,7 +2083,7 @@
           <a:p>
             <a:fld id="{B673521E-B280-4C28-8ED0-E34914655C34}" type="datetimeFigureOut">
               <a:rPr lang="en-US" smtClean="0"/>
-              <a:t>9/28/2019</a:t>
+              <a:t>9/29/2019</a:t>
             </a:fld>
             <a:endParaRPr lang="en-US"/>
           </a:p>
@@ -2389,7 +2394,7 @@
           <a:p>
             <a:fld id="{B673521E-B280-4C28-8ED0-E34914655C34}" type="datetimeFigureOut">
               <a:rPr lang="en-US" smtClean="0"/>
-              <a:t>9/28/2019</a:t>
+              <a:t>9/29/2019</a:t>
             </a:fld>
             <a:endParaRPr lang="en-US"/>
           </a:p>
@@ -2677,7 +2682,7 @@
           <a:p>
             <a:fld id="{B673521E-B280-4C28-8ED0-E34914655C34}" type="datetimeFigureOut">
               <a:rPr lang="en-US" smtClean="0"/>
-              <a:t>9/28/2019</a:t>
+              <a:t>9/29/2019</a:t>
             </a:fld>
             <a:endParaRPr lang="en-US"/>
           </a:p>
@@ -2918,7 +2923,7 @@
           <a:p>
             <a:fld id="{B673521E-B280-4C28-8ED0-E34914655C34}" type="datetimeFigureOut">
               <a:rPr lang="en-US" smtClean="0"/>
-              <a:t>9/28/2019</a:t>
+              <a:t>9/29/2019</a:t>
             </a:fld>
             <a:endParaRPr lang="en-US"/>
           </a:p>
@@ -3511,7 +3516,7 @@
             <a:pPr algn="ctr"/>
             <a:r>
               <a:rPr lang="en-US" dirty="0"/>
-              <a:t>User Interface Design SOS##</a:t>
+              <a:t>User Interface Design SOS07</a:t>
             </a:r>
           </a:p>
         </p:txBody>
@@ -3595,7 +3600,7 @@
             <a:pPr algn="ctr"/>
             <a:r>
               <a:rPr lang="en-US" dirty="0"/>
-              <a:t>Requirement Analysis SOS##</a:t>
+              <a:t>Requirement Analysis SOS16</a:t>
             </a:r>
           </a:p>
         </p:txBody>
@@ -3679,7 +3684,7 @@
             <a:pPr algn="ctr"/>
             <a:r>
               <a:rPr lang="en-US" dirty="0"/>
-              <a:t>Requirement Analysis SOS##</a:t>
+              <a:t>Requirement Analysis SOS17</a:t>
             </a:r>
           </a:p>
         </p:txBody>
@@ -3755,7 +3760,12 @@
             <p:ph type="title"/>
           </p:nvPr>
         </p:nvSpPr>
-        <p:spPr/>
+        <p:spPr>
+          <a:xfrm>
+            <a:off x="838200" y="98341"/>
+            <a:ext cx="10515600" cy="1325563"/>
+          </a:xfrm>
+        </p:spPr>
         <p:txBody>
           <a:bodyPr/>
           <a:lstStyle/>
@@ -3763,36 +3773,43 @@
             <a:pPr algn="ctr"/>
             <a:r>
               <a:rPr lang="en-US" dirty="0"/>
-              <a:t>Sequence Diagram SOS##</a:t>
-            </a:r>
-          </a:p>
-        </p:txBody>
-      </p:sp>
-      <p:sp>
-        <p:nvSpPr>
-          <p:cNvPr id="3" name="Content Placeholder 2">
-            <a:extLst>
-              <a:ext uri="{FF2B5EF4-FFF2-40B4-BE49-F238E27FC236}">
-                <a16:creationId xmlns:a16="http://schemas.microsoft.com/office/drawing/2014/main" id="{0525875A-D756-4462-9C54-A4C7CDA80A57}"/>
-              </a:ext>
-            </a:extLst>
-          </p:cNvPr>
-          <p:cNvSpPr>
-            <a:spLocks noGrp="1"/>
-          </p:cNvSpPr>
+              <a:t>Sequence Diagram SOS07</a:t>
+            </a:r>
+          </a:p>
+        </p:txBody>
+      </p:sp>
+      <p:pic>
+        <p:nvPicPr>
+          <p:cNvPr id="4" name="Content Placeholder 3">
+            <a:extLst>
+              <a:ext uri="{FF2B5EF4-FFF2-40B4-BE49-F238E27FC236}">
+                <a16:creationId xmlns:a16="http://schemas.microsoft.com/office/drawing/2014/main" id="{50014B5A-EC84-4B91-9591-63DAE1853CD4}"/>
+              </a:ext>
+            </a:extLst>
+          </p:cNvPr>
+          <p:cNvPicPr>
+            <a:picLocks noGrp="1"/>
+          </p:cNvPicPr>
           <p:nvPr>
             <p:ph idx="1"/>
           </p:nvPr>
-        </p:nvSpPr>
-        <p:spPr/>
-        <p:txBody>
-          <a:bodyPr/>
-          <a:lstStyle/>
-          <a:p>
-            <a:endParaRPr lang="en-US"/>
-          </a:p>
-        </p:txBody>
-      </p:sp>
+        </p:nvPicPr>
+        <p:blipFill>
+          <a:blip r:embed="rId2"/>
+          <a:stretch>
+            <a:fillRect/>
+          </a:stretch>
+        </p:blipFill>
+        <p:spPr>
+          <a:xfrm>
+            <a:off x="144379" y="994612"/>
+            <a:ext cx="11879179" cy="5765048"/>
+          </a:xfrm>
+          <a:prstGeom prst="rect">
+            <a:avLst/>
+          </a:prstGeom>
+        </p:spPr>
+      </p:pic>
     </p:spTree>
     <p:extLst>
       <p:ext uri="{BB962C8B-B14F-4D97-AF65-F5344CB8AC3E}">
@@ -3847,36 +3864,43 @@
             <a:pPr algn="ctr"/>
             <a:r>
               <a:rPr lang="en-US" dirty="0"/>
-              <a:t>Object Diagram SOS##</a:t>
-            </a:r>
-          </a:p>
-        </p:txBody>
-      </p:sp>
-      <p:sp>
-        <p:nvSpPr>
-          <p:cNvPr id="3" name="Content Placeholder 2">
-            <a:extLst>
-              <a:ext uri="{FF2B5EF4-FFF2-40B4-BE49-F238E27FC236}">
-                <a16:creationId xmlns:a16="http://schemas.microsoft.com/office/drawing/2014/main" id="{8FA7A74A-4FED-4D08-8C5E-0E6EA12A0163}"/>
-              </a:ext>
-            </a:extLst>
-          </p:cNvPr>
-          <p:cNvSpPr>
-            <a:spLocks noGrp="1"/>
-          </p:cNvSpPr>
+              <a:t>Object Diagram SOS16</a:t>
+            </a:r>
+          </a:p>
+        </p:txBody>
+      </p:sp>
+      <p:pic>
+        <p:nvPicPr>
+          <p:cNvPr id="5" name="Content Placeholder 4">
+            <a:extLst>
+              <a:ext uri="{FF2B5EF4-FFF2-40B4-BE49-F238E27FC236}">
+                <a16:creationId xmlns:a16="http://schemas.microsoft.com/office/drawing/2014/main" id="{06879217-ACD5-45BC-B1A2-3F35669770CD}"/>
+              </a:ext>
+            </a:extLst>
+          </p:cNvPr>
+          <p:cNvPicPr>
+            <a:picLocks noGrp="1"/>
+          </p:cNvPicPr>
           <p:nvPr>
             <p:ph idx="1"/>
           </p:nvPr>
-        </p:nvSpPr>
-        <p:spPr/>
-        <p:txBody>
-          <a:bodyPr/>
-          <a:lstStyle/>
-          <a:p>
-            <a:endParaRPr lang="en-US"/>
-          </a:p>
-        </p:txBody>
-      </p:sp>
+        </p:nvPicPr>
+        <p:blipFill>
+          <a:blip r:embed="rId2"/>
+          <a:stretch>
+            <a:fillRect/>
+          </a:stretch>
+        </p:blipFill>
+        <p:spPr>
+          <a:xfrm>
+            <a:off x="838200" y="1475874"/>
+            <a:ext cx="10776284" cy="4892842"/>
+          </a:xfrm>
+          <a:prstGeom prst="rect">
+            <a:avLst/>
+          </a:prstGeom>
+        </p:spPr>
+      </p:pic>
     </p:spTree>
     <p:extLst>
       <p:ext uri="{BB962C8B-B14F-4D97-AF65-F5344CB8AC3E}">
@@ -3923,7 +3947,12 @@
             <p:ph type="title"/>
           </p:nvPr>
         </p:nvSpPr>
-        <p:spPr/>
+        <p:spPr>
+          <a:xfrm>
+            <a:off x="838200" y="-160421"/>
+            <a:ext cx="10515600" cy="1325563"/>
+          </a:xfrm>
+        </p:spPr>
         <p:txBody>
           <a:bodyPr/>
           <a:lstStyle/>
@@ -3936,31 +3965,38 @@
           </a:p>
         </p:txBody>
       </p:sp>
-      <p:sp>
-        <p:nvSpPr>
-          <p:cNvPr id="3" name="Content Placeholder 2">
-            <a:extLst>
-              <a:ext uri="{FF2B5EF4-FFF2-40B4-BE49-F238E27FC236}">
-                <a16:creationId xmlns:a16="http://schemas.microsoft.com/office/drawing/2014/main" id="{A415937E-8788-412F-A6B9-27D153D5C626}"/>
-              </a:ext>
-            </a:extLst>
-          </p:cNvPr>
-          <p:cNvSpPr>
-            <a:spLocks noGrp="1"/>
-          </p:cNvSpPr>
+      <p:pic>
+        <p:nvPicPr>
+          <p:cNvPr id="12" name="Content Placeholder 11">
+            <a:extLst>
+              <a:ext uri="{FF2B5EF4-FFF2-40B4-BE49-F238E27FC236}">
+                <a16:creationId xmlns:a16="http://schemas.microsoft.com/office/drawing/2014/main" id="{3DC3B947-E42F-4F9D-A2BC-B88A05A7C25A}"/>
+              </a:ext>
+            </a:extLst>
+          </p:cNvPr>
+          <p:cNvPicPr>
+            <a:picLocks noGrp="1"/>
+          </p:cNvPicPr>
           <p:nvPr>
             <p:ph idx="1"/>
           </p:nvPr>
-        </p:nvSpPr>
-        <p:spPr/>
-        <p:txBody>
-          <a:bodyPr/>
-          <a:lstStyle/>
-          <a:p>
-            <a:endParaRPr lang="en-US"/>
-          </a:p>
-        </p:txBody>
-      </p:sp>
+        </p:nvPicPr>
+        <p:blipFill>
+          <a:blip r:embed="rId2"/>
+          <a:stretch>
+            <a:fillRect/>
+          </a:stretch>
+        </p:blipFill>
+        <p:spPr>
+          <a:xfrm>
+            <a:off x="0" y="786063"/>
+            <a:ext cx="12192001" cy="6071937"/>
+          </a:xfrm>
+          <a:prstGeom prst="rect">
+            <a:avLst/>
+          </a:prstGeom>
+        </p:spPr>
+      </p:pic>
     </p:spTree>
     <p:extLst>
       <p:ext uri="{BB962C8B-B14F-4D97-AF65-F5344CB8AC3E}">
@@ -4041,7 +4077,65 @@
           <a:bodyPr/>
           <a:lstStyle/>
           <a:p>
-            <a:endParaRPr lang="en-US" dirty="0"/>
+            <a:r>
+              <a:rPr lang="en-US" dirty="0"/>
+              <a:t>Manage Different Student Organizations:</a:t>
+            </a:r>
+          </a:p>
+          <a:p>
+            <a:pPr lvl="1"/>
+            <a:r>
+              <a:rPr lang="en-US" dirty="0"/>
+              <a:t>Information on Members</a:t>
+            </a:r>
+          </a:p>
+          <a:p>
+            <a:pPr lvl="1"/>
+            <a:r>
+              <a:rPr lang="en-US" dirty="0"/>
+              <a:t>Event Creation</a:t>
+            </a:r>
+          </a:p>
+          <a:p>
+            <a:pPr lvl="1"/>
+            <a:r>
+              <a:rPr lang="en-US" dirty="0"/>
+              <a:t>Role Designation</a:t>
+            </a:r>
+          </a:p>
+          <a:p>
+            <a:r>
+              <a:rPr lang="en-US" dirty="0"/>
+              <a:t>Target audiences:</a:t>
+            </a:r>
+          </a:p>
+          <a:p>
+            <a:pPr lvl="1"/>
+            <a:r>
+              <a:rPr lang="en-US" dirty="0"/>
+              <a:t>University and College students</a:t>
+            </a:r>
+          </a:p>
+          <a:p>
+            <a:pPr lvl="1"/>
+            <a:r>
+              <a:rPr lang="en-US" dirty="0"/>
+              <a:t>Organizations</a:t>
+            </a:r>
+          </a:p>
+          <a:p>
+            <a:pPr lvl="1"/>
+            <a:r>
+              <a:rPr lang="en-US" dirty="0"/>
+              <a:t>Clubs</a:t>
+            </a:r>
+          </a:p>
+          <a:p>
+            <a:pPr lvl="1"/>
+            <a:r>
+              <a:rPr lang="en-US" dirty="0"/>
+              <a:t>Monitor/administering parties</a:t>
+            </a:r>
           </a:p>
         </p:txBody>
       </p:sp>
@@ -4061,6 +4155,14 @@
 <file path=ppt/slides/slide3.xml><?xml version="1.0" encoding="utf-8"?>
 <p:sld xmlns:a="http://schemas.openxmlformats.org/drawingml/2006/main" xmlns:r="http://schemas.openxmlformats.org/officeDocument/2006/relationships" xmlns:p="http://schemas.openxmlformats.org/presentationml/2006/main">
   <p:cSld>
+    <p:bg>
+      <p:bgPr>
+        <a:solidFill>
+          <a:schemeClr val="bg1"/>
+        </a:solidFill>
+        <a:effectLst/>
+      </p:bgPr>
+    </p:bg>
     <p:spTree>
       <p:nvGrpSpPr>
         <p:cNvPr id="1" name=""/>
@@ -4077,6 +4179,75 @@
       </p:grpSpPr>
       <p:sp>
         <p:nvSpPr>
+          <p:cNvPr id="15" name="Rectangle 12">
+            <a:extLst>
+              <a:ext uri="{FF2B5EF4-FFF2-40B4-BE49-F238E27FC236}">
+                <a16:creationId xmlns:a16="http://schemas.microsoft.com/office/drawing/2014/main" id="{E02F3C71-C981-4614-98EA-D6C494F8091E}"/>
+              </a:ext>
+              <a:ext uri="{C183D7F6-B498-43B3-948B-1728B52AA6E4}">
+                <adec:decorative xmlns:adec="http://schemas.microsoft.com/office/drawing/2017/decorative" val="1"/>
+              </a:ext>
+            </a:extLst>
+          </p:cNvPr>
+          <p:cNvSpPr>
+            <a:spLocks noGrp="1" noRot="1" noChangeAspect="1" noMove="1" noResize="1" noEditPoints="1" noAdjustHandles="1" noChangeArrowheads="1" noChangeShapeType="1" noTextEdit="1"/>
+          </p:cNvSpPr>
+          <p:nvPr>
+            <p:extLst>
+              <p:ext uri="{386F3935-93C4-4BCD-93E2-E3B085C9AB24}">
+                <p16:designElem xmlns:p16="http://schemas.microsoft.com/office/powerpoint/2015/main" val="1"/>
+              </p:ext>
+            </p:extLst>
+          </p:nvPr>
+        </p:nvSpPr>
+        <p:spPr bwMode="ltGray">
+          <a:xfrm>
+            <a:off x="336883" y="321176"/>
+            <a:ext cx="7174247" cy="5896743"/>
+          </a:xfrm>
+          <a:prstGeom prst="rect">
+            <a:avLst/>
+          </a:prstGeom>
+          <a:solidFill>
+            <a:schemeClr val="tx1">
+              <a:alpha val="15000"/>
+            </a:schemeClr>
+          </a:solidFill>
+          <a:ln w="127000" cap="sq" cmpd="thinThick">
+            <a:solidFill>
+              <a:schemeClr val="tx1">
+                <a:alpha val="10000"/>
+              </a:schemeClr>
+            </a:solidFill>
+          </a:ln>
+        </p:spPr>
+        <p:style>
+          <a:lnRef idx="2">
+            <a:schemeClr val="accent1">
+              <a:shade val="50000"/>
+            </a:schemeClr>
+          </a:lnRef>
+          <a:fillRef idx="1">
+            <a:schemeClr val="accent1"/>
+          </a:fillRef>
+          <a:effectRef idx="0">
+            <a:schemeClr val="accent1"/>
+          </a:effectRef>
+          <a:fontRef idx="minor">
+            <a:schemeClr val="lt1"/>
+          </a:fontRef>
+        </p:style>
+        <p:txBody>
+          <a:bodyPr rtlCol="0" anchor="ctr"/>
+          <a:lstStyle/>
+          <a:p>
+            <a:pPr algn="ctr"/>
+            <a:endParaRPr lang="en-US"/>
+          </a:p>
+        </p:txBody>
+      </p:sp>
+      <p:sp>
+        <p:nvSpPr>
           <p:cNvPr id="2" name="Title 1">
             <a:extLst>
               <a:ext uri="{FF2B5EF4-FFF2-40B4-BE49-F238E27FC236}">
@@ -4091,44 +4262,87 @@
             <p:ph type="title"/>
           </p:nvPr>
         </p:nvSpPr>
-        <p:spPr/>
-        <p:txBody>
-          <a:bodyPr/>
-          <a:lstStyle/>
-          <a:p>
-            <a:pPr algn="ctr"/>
-            <a:r>
-              <a:rPr lang="en-US" dirty="0"/>
+        <p:spPr>
+          <a:xfrm>
+            <a:off x="821516" y="640263"/>
+            <a:ext cx="6204984" cy="1344975"/>
+          </a:xfrm>
+        </p:spPr>
+        <p:txBody>
+          <a:bodyPr>
+            <a:normAutofit/>
+          </a:bodyPr>
+          <a:lstStyle/>
+          <a:p>
+            <a:r>
+              <a:rPr lang="en-US" sz="4000"/>
               <a:t>Project Schedule</a:t>
             </a:r>
           </a:p>
         </p:txBody>
       </p:sp>
-      <p:sp>
-        <p:nvSpPr>
-          <p:cNvPr id="3" name="Content Placeholder 2">
-            <a:extLst>
-              <a:ext uri="{FF2B5EF4-FFF2-40B4-BE49-F238E27FC236}">
-                <a16:creationId xmlns:a16="http://schemas.microsoft.com/office/drawing/2014/main" id="{BD626DDD-33CD-4D3A-A416-D8B10159B129}"/>
-              </a:ext>
-            </a:extLst>
-          </p:cNvPr>
-          <p:cNvSpPr>
-            <a:spLocks noGrp="1"/>
-          </p:cNvSpPr>
+      <p:pic>
+        <p:nvPicPr>
+          <p:cNvPr id="10" name="Picture 9">
+            <a:extLst>
+              <a:ext uri="{FF2B5EF4-FFF2-40B4-BE49-F238E27FC236}">
+                <a16:creationId xmlns:a16="http://schemas.microsoft.com/office/drawing/2014/main" id="{E0F06CA0-4488-4D4E-98C6-3ECBAD6B1AD0}"/>
+              </a:ext>
+            </a:extLst>
+          </p:cNvPr>
+          <p:cNvPicPr>
+            <a:picLocks noChangeAspect="1"/>
+          </p:cNvPicPr>
+          <p:nvPr/>
+        </p:nvPicPr>
+        <p:blipFill>
+          <a:blip r:embed="rId2"/>
+          <a:stretch>
+            <a:fillRect/>
+          </a:stretch>
+        </p:blipFill>
+        <p:spPr>
+          <a:xfrm>
+            <a:off x="7685214" y="2069120"/>
+            <a:ext cx="4383811" cy="2641263"/>
+          </a:xfrm>
+          <a:prstGeom prst="rect">
+            <a:avLst/>
+          </a:prstGeom>
+        </p:spPr>
+      </p:pic>
+      <p:pic>
+        <p:nvPicPr>
+          <p:cNvPr id="14" name="Content Placeholder 13">
+            <a:extLst>
+              <a:ext uri="{FF2B5EF4-FFF2-40B4-BE49-F238E27FC236}">
+                <a16:creationId xmlns:a16="http://schemas.microsoft.com/office/drawing/2014/main" id="{9F6B13FB-8AC5-4871-9D3A-168808988F29}"/>
+              </a:ext>
+            </a:extLst>
+          </p:cNvPr>
+          <p:cNvPicPr>
+            <a:picLocks noGrp="1" noChangeAspect="1"/>
+          </p:cNvPicPr>
           <p:nvPr>
             <p:ph idx="1"/>
           </p:nvPr>
-        </p:nvSpPr>
-        <p:spPr/>
-        <p:txBody>
-          <a:bodyPr/>
-          <a:lstStyle/>
-          <a:p>
-            <a:endParaRPr lang="en-US"/>
-          </a:p>
-        </p:txBody>
-      </p:sp>
+        </p:nvPicPr>
+        <p:blipFill>
+          <a:blip r:embed="rId3"/>
+          <a:stretch>
+            <a:fillRect/>
+          </a:stretch>
+        </p:blipFill>
+        <p:spPr>
+          <a:xfrm>
+            <a:off x="628198" y="1985238"/>
+            <a:ext cx="6398302" cy="3331140"/>
+          </a:xfrm>
+          <a:prstGeom prst="rect">
+            <a:avLst/>
+          </a:prstGeom>
+        </p:spPr>
+      </p:pic>
     </p:spTree>
     <p:extLst>
       <p:ext uri="{BB962C8B-B14F-4D97-AF65-F5344CB8AC3E}">
@@ -4145,6 +4359,14 @@
 <file path=ppt/slides/slide4.xml><?xml version="1.0" encoding="utf-8"?>
 <p:sld xmlns:a="http://schemas.openxmlformats.org/drawingml/2006/main" xmlns:r="http://schemas.openxmlformats.org/officeDocument/2006/relationships" xmlns:p="http://schemas.openxmlformats.org/presentationml/2006/main">
   <p:cSld>
+    <p:bg>
+      <p:bgPr>
+        <a:solidFill>
+          <a:schemeClr val="bg1"/>
+        </a:solidFill>
+        <a:effectLst/>
+      </p:bgPr>
+    </p:bg>
     <p:spTree>
       <p:nvGrpSpPr>
         <p:cNvPr id="1" name=""/>
@@ -4161,6 +4383,75 @@
       </p:grpSpPr>
       <p:sp>
         <p:nvSpPr>
+          <p:cNvPr id="9" name="Rectangle 8">
+            <a:extLst>
+              <a:ext uri="{FF2B5EF4-FFF2-40B4-BE49-F238E27FC236}">
+                <a16:creationId xmlns:a16="http://schemas.microsoft.com/office/drawing/2014/main" id="{AB45A142-4255-493C-8284-5D566C121B10}"/>
+              </a:ext>
+              <a:ext uri="{C183D7F6-B498-43B3-948B-1728B52AA6E4}">
+                <adec:decorative xmlns:adec="http://schemas.microsoft.com/office/drawing/2017/decorative" val="1"/>
+              </a:ext>
+            </a:extLst>
+          </p:cNvPr>
+          <p:cNvSpPr>
+            <a:spLocks noGrp="1" noRot="1" noChangeAspect="1" noMove="1" noResize="1" noEditPoints="1" noAdjustHandles="1" noChangeArrowheads="1" noChangeShapeType="1" noTextEdit="1"/>
+          </p:cNvSpPr>
+          <p:nvPr>
+            <p:extLst>
+              <p:ext uri="{386F3935-93C4-4BCD-93E2-E3B085C9AB24}">
+                <p16:designElem xmlns:p16="http://schemas.microsoft.com/office/powerpoint/2015/main" val="1"/>
+              </p:ext>
+            </p:extLst>
+          </p:nvPr>
+        </p:nvSpPr>
+        <p:spPr bwMode="ltGray">
+          <a:xfrm>
+            <a:off x="336884" y="321177"/>
+            <a:ext cx="4332307" cy="6179552"/>
+          </a:xfrm>
+          <a:prstGeom prst="rect">
+            <a:avLst/>
+          </a:prstGeom>
+          <a:solidFill>
+            <a:srgbClr val="404040">
+              <a:alpha val="89804"/>
+            </a:srgbClr>
+          </a:solidFill>
+          <a:ln w="127000" cap="sq" cmpd="thinThick">
+            <a:solidFill>
+              <a:srgbClr val="595959">
+                <a:alpha val="80000"/>
+              </a:srgbClr>
+            </a:solidFill>
+          </a:ln>
+        </p:spPr>
+        <p:style>
+          <a:lnRef idx="2">
+            <a:schemeClr val="accent1">
+              <a:shade val="50000"/>
+            </a:schemeClr>
+          </a:lnRef>
+          <a:fillRef idx="1">
+            <a:schemeClr val="accent1"/>
+          </a:fillRef>
+          <a:effectRef idx="0">
+            <a:schemeClr val="accent1"/>
+          </a:effectRef>
+          <a:fontRef idx="minor">
+            <a:schemeClr val="lt1"/>
+          </a:fontRef>
+        </p:style>
+        <p:txBody>
+          <a:bodyPr rtlCol="0" anchor="ctr"/>
+          <a:lstStyle/>
+          <a:p>
+            <a:pPr algn="ctr"/>
+            <a:endParaRPr lang="en-US"/>
+          </a:p>
+        </p:txBody>
+      </p:sp>
+      <p:sp>
+        <p:nvSpPr>
           <p:cNvPr id="2" name="Title 1">
             <a:extLst>
               <a:ext uri="{FF2B5EF4-FFF2-40B4-BE49-F238E27FC236}">
@@ -4175,44 +4466,117 @@
             <p:ph type="title"/>
           </p:nvPr>
         </p:nvSpPr>
-        <p:spPr/>
-        <p:txBody>
-          <a:bodyPr/>
+        <p:spPr>
+          <a:xfrm>
+            <a:off x="674237" y="914400"/>
+            <a:ext cx="3657600" cy="2887579"/>
+          </a:xfrm>
+        </p:spPr>
+        <p:txBody>
+          <a:bodyPr vert="horz" lIns="91440" tIns="45720" rIns="91440" bIns="45720" rtlCol="0" anchor="b">
+            <a:normAutofit/>
+          </a:bodyPr>
           <a:lstStyle/>
           <a:p>
             <a:pPr algn="ctr"/>
             <a:r>
-              <a:rPr lang="en-US" dirty="0"/>
+              <a:rPr lang="en-US" sz="4800" kern="1200">
+                <a:solidFill>
+                  <a:srgbClr val="FFFFFF"/>
+                </a:solidFill>
+                <a:latin typeface="+mj-lt"/>
+                <a:ea typeface="+mj-ea"/>
+                <a:cs typeface="+mj-cs"/>
+              </a:rPr>
               <a:t>UML Diagram</a:t>
             </a:r>
           </a:p>
         </p:txBody>
       </p:sp>
-      <p:sp>
-        <p:nvSpPr>
-          <p:cNvPr id="3" name="Content Placeholder 2">
-            <a:extLst>
-              <a:ext uri="{FF2B5EF4-FFF2-40B4-BE49-F238E27FC236}">
-                <a16:creationId xmlns:a16="http://schemas.microsoft.com/office/drawing/2014/main" id="{2F636BF0-E64C-4B73-9538-34F0A446513F}"/>
-              </a:ext>
-            </a:extLst>
-          </p:cNvPr>
-          <p:cNvSpPr>
-            <a:spLocks noGrp="1"/>
-          </p:cNvSpPr>
+      <p:cxnSp>
+        <p:nvCxnSpPr>
+          <p:cNvPr id="11" name="Straight Connector 10">
+            <a:extLst>
+              <a:ext uri="{FF2B5EF4-FFF2-40B4-BE49-F238E27FC236}">
+                <a16:creationId xmlns:a16="http://schemas.microsoft.com/office/drawing/2014/main" id="{38FB9660-F42F-4313-BBC4-47C007FE484C}"/>
+              </a:ext>
+              <a:ext uri="{C183D7F6-B498-43B3-948B-1728B52AA6E4}">
+                <adec:decorative xmlns:adec="http://schemas.microsoft.com/office/drawing/2017/decorative" val="1"/>
+              </a:ext>
+            </a:extLst>
+          </p:cNvPr>
+          <p:cNvCxnSpPr>
+            <a:cxnSpLocks noGrp="1" noRot="1" noChangeAspect="1" noMove="1" noResize="1" noEditPoints="1" noAdjustHandles="1" noChangeArrowheads="1" noChangeShapeType="1"/>
+          </p:cNvCxnSpPr>
+          <p:nvPr>
+            <p:extLst>
+              <p:ext uri="{386F3935-93C4-4BCD-93E2-E3B085C9AB24}">
+                <p16:designElem xmlns:p16="http://schemas.microsoft.com/office/powerpoint/2015/main" val="1"/>
+              </p:ext>
+            </p:extLst>
+          </p:nvPr>
+        </p:nvCxnSpPr>
+        <p:spPr>
+          <a:xfrm>
+            <a:off x="1191126" y="3910267"/>
+            <a:ext cx="2586790" cy="0"/>
+          </a:xfrm>
+          <a:prstGeom prst="line">
+            <a:avLst/>
+          </a:prstGeom>
+          <a:ln w="22225">
+            <a:solidFill>
+              <a:srgbClr val="D9D9D9"/>
+            </a:solidFill>
+          </a:ln>
+        </p:spPr>
+        <p:style>
+          <a:lnRef idx="1">
+            <a:schemeClr val="accent1"/>
+          </a:lnRef>
+          <a:fillRef idx="0">
+            <a:schemeClr val="accent1"/>
+          </a:fillRef>
+          <a:effectRef idx="0">
+            <a:schemeClr val="accent1"/>
+          </a:effectRef>
+          <a:fontRef idx="minor">
+            <a:schemeClr val="tx1"/>
+          </a:fontRef>
+        </p:style>
+      </p:cxnSp>
+      <p:pic>
+        <p:nvPicPr>
+          <p:cNvPr id="4" name="Content Placeholder 6" descr="A close up of a map&#10;&#10;Description automatically generated">
+            <a:extLst>
+              <a:ext uri="{FF2B5EF4-FFF2-40B4-BE49-F238E27FC236}">
+                <a16:creationId xmlns:a16="http://schemas.microsoft.com/office/drawing/2014/main" id="{21E0E106-ACD6-4DDE-9BE3-23DFB46ABBBE}"/>
+              </a:ext>
+            </a:extLst>
+          </p:cNvPr>
+          <p:cNvPicPr>
+            <a:picLocks noGrp="1"/>
+          </p:cNvPicPr>
           <p:nvPr>
             <p:ph idx="1"/>
           </p:nvPr>
-        </p:nvSpPr>
-        <p:spPr/>
-        <p:txBody>
-          <a:bodyPr/>
-          <a:lstStyle/>
-          <a:p>
-            <a:endParaRPr lang="en-US"/>
-          </a:p>
-        </p:txBody>
-      </p:sp>
+        </p:nvPicPr>
+        <p:blipFill>
+          <a:blip r:embed="rId2"/>
+          <a:stretch>
+            <a:fillRect/>
+          </a:stretch>
+        </p:blipFill>
+        <p:spPr>
+          <a:xfrm>
+            <a:off x="5153822" y="811554"/>
+            <a:ext cx="6553545" cy="5242834"/>
+          </a:xfrm>
+          <a:prstGeom prst="rect">
+            <a:avLst/>
+          </a:prstGeom>
+        </p:spPr>
+      </p:pic>
     </p:spTree>
     <p:extLst>
       <p:ext uri="{BB962C8B-B14F-4D97-AF65-F5344CB8AC3E}">
@@ -4267,33 +4631,99 @@
             <a:pPr algn="ctr"/>
             <a:r>
               <a:rPr lang="en-US" dirty="0"/>
+              <a:t>Use Case SOS16 Create Organization</a:t>
+            </a:r>
+          </a:p>
+        </p:txBody>
+      </p:sp>
+      <p:sp>
+        <p:nvSpPr>
+          <p:cNvPr id="3" name="Content Placeholder 2">
+            <a:extLst>
+              <a:ext uri="{FF2B5EF4-FFF2-40B4-BE49-F238E27FC236}">
+                <a16:creationId xmlns:a16="http://schemas.microsoft.com/office/drawing/2014/main" id="{E6026C05-500A-4A96-8FC3-68BA23690DBA}"/>
+              </a:ext>
+            </a:extLst>
+          </p:cNvPr>
+          <p:cNvSpPr>
+            <a:spLocks noGrp="1"/>
+          </p:cNvSpPr>
+          <p:nvPr>
+            <p:ph idx="1"/>
+          </p:nvPr>
+        </p:nvSpPr>
+        <p:spPr/>
+        <p:txBody>
+          <a:bodyPr/>
+          <a:lstStyle/>
+          <a:p>
+            <a:r>
+              <a:rPr lang="en-US" dirty="0"/>
               <a:t>Functional Requirements</a:t>
             </a:r>
           </a:p>
-        </p:txBody>
-      </p:sp>
-      <p:sp>
-        <p:nvSpPr>
-          <p:cNvPr id="3" name="Content Placeholder 2">
-            <a:extLst>
-              <a:ext uri="{FF2B5EF4-FFF2-40B4-BE49-F238E27FC236}">
-                <a16:creationId xmlns:a16="http://schemas.microsoft.com/office/drawing/2014/main" id="{E6026C05-500A-4A96-8FC3-68BA23690DBA}"/>
-              </a:ext>
-            </a:extLst>
-          </p:cNvPr>
-          <p:cNvSpPr>
-            <a:spLocks noGrp="1"/>
-          </p:cNvSpPr>
-          <p:nvPr>
-            <p:ph idx="1"/>
-          </p:nvPr>
-        </p:nvSpPr>
-        <p:spPr/>
-        <p:txBody>
-          <a:bodyPr/>
-          <a:lstStyle/>
-          <a:p>
-            <a:endParaRPr lang="en-US"/>
+          <a:p>
+            <a:pPr marL="457200" lvl="1" indent="0">
+              <a:buNone/>
+            </a:pPr>
+            <a:r>
+              <a:rPr lang="en-US" dirty="0"/>
+              <a:t>1. User must have an account in the webpage and logged in.</a:t>
+            </a:r>
+          </a:p>
+          <a:p>
+            <a:pPr marL="457200" lvl="1" indent="0">
+              <a:buNone/>
+            </a:pPr>
+            <a:r>
+              <a:rPr lang="en-US" dirty="0"/>
+              <a:t>2. User clicks on “Organization Tab.”</a:t>
+            </a:r>
+          </a:p>
+          <a:p>
+            <a:pPr marL="457200" lvl="1" indent="0">
+              <a:buNone/>
+            </a:pPr>
+            <a:r>
+              <a:rPr lang="en-US" dirty="0"/>
+              <a:t>3. The webpage switches to organization page.</a:t>
+            </a:r>
+          </a:p>
+          <a:p>
+            <a:pPr marL="457200" lvl="1" indent="0">
+              <a:buNone/>
+            </a:pPr>
+            <a:r>
+              <a:rPr lang="en-US" dirty="0"/>
+              <a:t>4. User click on “Create Organization.”</a:t>
+            </a:r>
+          </a:p>
+          <a:p>
+            <a:pPr marL="457200" lvl="1" indent="0">
+              <a:buNone/>
+            </a:pPr>
+            <a:r>
+              <a:rPr lang="en-US" dirty="0"/>
+              <a:t>5. User then fills out form asking for the organization details.</a:t>
+            </a:r>
+          </a:p>
+          <a:p>
+            <a:pPr marL="457200" lvl="1" indent="0">
+              <a:buNone/>
+            </a:pPr>
+            <a:r>
+              <a:rPr lang="en-US" dirty="0"/>
+              <a:t>6. User submits form to webpage.</a:t>
+            </a:r>
+          </a:p>
+          <a:p>
+            <a:pPr marL="457200" lvl="1" indent="0">
+              <a:buNone/>
+            </a:pPr>
+            <a:r>
+              <a:rPr lang="en-US" dirty="0"/>
+              <a:t>7. User then sees their newly created organization on the screen and is the    leader of said organization.</a:t>
+            </a:r>
           </a:p>
         </p:txBody>
       </p:sp>
@@ -4348,7 +4778,11 @@
           <a:bodyPr/>
           <a:lstStyle/>
           <a:p>
-            <a:endParaRPr lang="en-US" dirty="0"/>
+            <a:pPr algn="ctr"/>
+            <a:r>
+              <a:rPr lang="en-US" dirty="0"/>
+              <a:t>Use Case SOS16 Create Organization</a:t>
+            </a:r>
           </a:p>
         </p:txBody>
       </p:sp>
@@ -4373,7 +4807,73 @@
           <a:bodyPr/>
           <a:lstStyle/>
           <a:p>
-            <a:endParaRPr lang="en-US"/>
+            <a:r>
+              <a:rPr lang="en-US" dirty="0"/>
+              <a:t>Nonfunctional Requirements</a:t>
+            </a:r>
+          </a:p>
+          <a:p>
+            <a:pPr lvl="1"/>
+            <a:r>
+              <a:rPr lang="en-US" dirty="0"/>
+              <a:t>Usability</a:t>
+            </a:r>
+          </a:p>
+          <a:p>
+            <a:pPr lvl="2"/>
+            <a:r>
+              <a:rPr lang="en-US" sz="2200" dirty="0"/>
+              <a:t>On average the user should take 2 minutes to complete the request.</a:t>
+            </a:r>
+          </a:p>
+          <a:p>
+            <a:pPr lvl="1"/>
+            <a:r>
+              <a:rPr lang="en-US" dirty="0"/>
+              <a:t>Reliability</a:t>
+            </a:r>
+          </a:p>
+          <a:p>
+            <a:pPr lvl="2"/>
+            <a:r>
+              <a:rPr lang="en-US" sz="2200" dirty="0"/>
+              <a:t>Mean time to failure – 5% failures for every month of operation is acceptable.</a:t>
+            </a:r>
+          </a:p>
+          <a:p>
+            <a:pPr lvl="1"/>
+            <a:r>
+              <a:rPr lang="en-US" dirty="0"/>
+              <a:t>Performance</a:t>
+            </a:r>
+          </a:p>
+          <a:p>
+            <a:pPr lvl="2"/>
+            <a:r>
+              <a:rPr lang="en-US" sz="2200" dirty="0"/>
+              <a:t>Request should be sent and saved within 6 seconds.</a:t>
+            </a:r>
+          </a:p>
+          <a:p>
+            <a:pPr lvl="2"/>
+            <a:r>
+              <a:rPr lang="en-US" sz="2200" dirty="0"/>
+              <a:t>System should be able to handle 200 requests in 1 minute.</a:t>
+            </a:r>
+          </a:p>
+          <a:p>
+            <a:pPr lvl="1"/>
+            <a:r>
+              <a:rPr lang="en-US" dirty="0"/>
+              <a:t>Implementation</a:t>
+            </a:r>
+          </a:p>
+          <a:p>
+            <a:pPr lvl="2"/>
+            <a:r>
+              <a:rPr lang="en-US" sz="2200" dirty="0"/>
+              <a:t>JS &amp; React (front end), Java and MySQL (back-end).</a:t>
+            </a:r>
           </a:p>
         </p:txBody>
       </p:sp>
@@ -4428,7 +4928,11 @@
           <a:bodyPr/>
           <a:lstStyle/>
           <a:p>
-            <a:endParaRPr lang="en-US"/>
+            <a:pPr algn="ctr"/>
+            <a:r>
+              <a:rPr lang="en-US" dirty="0"/>
+              <a:t>Use Case SOS07 Edit Profile (Security)</a:t>
+            </a:r>
           </a:p>
         </p:txBody>
       </p:sp>
@@ -4453,7 +4957,95 @@
           <a:bodyPr/>
           <a:lstStyle/>
           <a:p>
-            <a:endParaRPr lang="en-US"/>
+            <a:r>
+              <a:rPr lang="en-US" dirty="0"/>
+              <a:t>Functional Requirements:</a:t>
+            </a:r>
+          </a:p>
+          <a:p>
+            <a:pPr marL="457200" lvl="1" indent="0">
+              <a:buNone/>
+            </a:pPr>
+            <a:r>
+              <a:rPr lang="en-US" dirty="0"/>
+              <a:t>1. User must have an account in the system and be logged in.</a:t>
+            </a:r>
+          </a:p>
+          <a:p>
+            <a:pPr marL="457200" lvl="1" indent="0">
+              <a:buNone/>
+            </a:pPr>
+            <a:r>
+              <a:rPr lang="en-US" dirty="0"/>
+              <a:t>2. User is in their profile page and clicks “Edit Profile.”</a:t>
+            </a:r>
+          </a:p>
+          <a:p>
+            <a:pPr marL="457200" lvl="1" indent="0">
+              <a:buNone/>
+            </a:pPr>
+            <a:r>
+              <a:rPr lang="en-US" dirty="0"/>
+              <a:t>3. User is then shown their current information in an editable form.</a:t>
+            </a:r>
+          </a:p>
+          <a:p>
+            <a:pPr marL="457200" lvl="1" indent="0">
+              <a:buNone/>
+            </a:pPr>
+            <a:r>
+              <a:rPr lang="en-US" dirty="0"/>
+              <a:t>4. User inputs the data they would like to change.</a:t>
+            </a:r>
+          </a:p>
+          <a:p>
+            <a:pPr marL="457200" lvl="1" indent="0">
+              <a:buNone/>
+            </a:pPr>
+            <a:r>
+              <a:rPr lang="en-US" dirty="0"/>
+              <a:t>5. User submits the request to change their information.</a:t>
+            </a:r>
+          </a:p>
+          <a:p>
+            <a:pPr marL="457200" lvl="1" indent="0">
+              <a:buNone/>
+            </a:pPr>
+            <a:r>
+              <a:rPr lang="en-US" dirty="0"/>
+              <a:t>6. The webpage prompts the user for their password.</a:t>
+            </a:r>
+          </a:p>
+          <a:p>
+            <a:pPr marL="457200" lvl="1" indent="0">
+              <a:buNone/>
+            </a:pPr>
+            <a:r>
+              <a:rPr lang="en-US" dirty="0"/>
+              <a:t>7. User inputs password and submits then system authenticates their request.</a:t>
+            </a:r>
+          </a:p>
+          <a:p>
+            <a:pPr marL="457200" lvl="1" indent="0">
+              <a:buNone/>
+            </a:pPr>
+            <a:r>
+              <a:rPr lang="en-US" dirty="0"/>
+              <a:t>8. System then changes in the data storage.</a:t>
+            </a:r>
+          </a:p>
+          <a:p>
+            <a:pPr marL="457200" lvl="1" indent="0">
+              <a:buNone/>
+            </a:pPr>
+            <a:r>
+              <a:rPr lang="en-US" dirty="0"/>
+              <a:t>9. User receives notification that their profile has been successfully edited.</a:t>
+            </a:r>
+          </a:p>
+          <a:p>
+            <a:pPr lvl="1"/>
+            <a:endParaRPr lang="en-US" dirty="0"/>
           </a:p>
         </p:txBody>
       </p:sp>
@@ -4508,7 +5100,11 @@
           <a:bodyPr/>
           <a:lstStyle/>
           <a:p>
-            <a:endParaRPr lang="en-US"/>
+            <a:pPr algn="ctr"/>
+            <a:r>
+              <a:rPr lang="en-US" dirty="0"/>
+              <a:t>Use Case SOS07 Edit Profile (Security)</a:t>
+            </a:r>
           </a:p>
         </p:txBody>
       </p:sp>
@@ -4530,10 +5126,88 @@
         </p:nvSpPr>
         <p:spPr/>
         <p:txBody>
-          <a:bodyPr/>
-          <a:lstStyle/>
-          <a:p>
-            <a:endParaRPr lang="en-US"/>
+          <a:bodyPr>
+            <a:normAutofit/>
+          </a:bodyPr>
+          <a:lstStyle/>
+          <a:p>
+            <a:r>
+              <a:rPr lang="en-US" dirty="0"/>
+              <a:t>Nonfunctional Requirements</a:t>
+            </a:r>
+          </a:p>
+          <a:p>
+            <a:pPr lvl="1"/>
+            <a:r>
+              <a:rPr lang="en-US" dirty="0"/>
+              <a:t>Usability</a:t>
+            </a:r>
+          </a:p>
+          <a:p>
+            <a:pPr lvl="2"/>
+            <a:r>
+              <a:rPr lang="en-US" dirty="0"/>
+              <a:t>User must be aware of their privileges and what actions those privileges permit.</a:t>
+            </a:r>
+          </a:p>
+          <a:p>
+            <a:pPr lvl="1"/>
+            <a:r>
+              <a:rPr lang="en-US" dirty="0"/>
+              <a:t>Availability</a:t>
+            </a:r>
+          </a:p>
+          <a:p>
+            <a:pPr lvl="2"/>
+            <a:r>
+              <a:rPr lang="en-US" dirty="0"/>
+              <a:t>Downtime for Login Back-up – 30 minutes in a 24-hour period.</a:t>
+            </a:r>
+          </a:p>
+          <a:p>
+            <a:pPr lvl="1"/>
+            <a:r>
+              <a:rPr lang="en-US" dirty="0"/>
+              <a:t>Performance</a:t>
+            </a:r>
+          </a:p>
+          <a:p>
+            <a:pPr lvl="2"/>
+            <a:r>
+              <a:rPr lang="en-US" dirty="0"/>
+              <a:t>The system should handle 20 privilege checks in 1 minute.</a:t>
+            </a:r>
+          </a:p>
+          <a:p>
+            <a:pPr lvl="2"/>
+            <a:r>
+              <a:rPr lang="en-US" dirty="0"/>
+              <a:t>The system should be done with the edit request within 2 seconds.</a:t>
+            </a:r>
+          </a:p>
+          <a:p>
+            <a:pPr lvl="1"/>
+            <a:r>
+              <a:rPr lang="en-US" dirty="0"/>
+              <a:t>Supportability</a:t>
+            </a:r>
+          </a:p>
+          <a:p>
+            <a:pPr lvl="2"/>
+            <a:r>
+              <a:rPr lang="en-US" dirty="0"/>
+              <a:t>Should be supported by all browsers.</a:t>
+            </a:r>
+            <a:br>
+              <a:rPr lang="en-US" dirty="0"/>
+            </a:br>
+            <a:br>
+              <a:rPr lang="en-US" dirty="0"/>
+            </a:br>
+            <a:endParaRPr lang="en-US" dirty="0"/>
+          </a:p>
+          <a:p>
+            <a:endParaRPr lang="en-US" dirty="0"/>
           </a:p>
         </p:txBody>
       </p:sp>
@@ -4591,7 +5265,7 @@
             <a:pPr algn="ctr"/>
             <a:r>
               <a:rPr lang="en-US" dirty="0"/>
-              <a:t>User Interface Design SOS##</a:t>
+              <a:t>User Interface Design SOS16</a:t>
             </a:r>
           </a:p>
         </p:txBody>

</xml_diff>

<commit_message>
Pushing last changes for the night.
</commit_message>
<xml_diff>
--- a/specifications/deliv1/SOS Deliverable 1 Presentation.pptx
+++ b/specifications/deliv1/SOS Deliverable 1 Presentation.pptx
@@ -3893,8 +3893,8 @@
         </p:blipFill>
         <p:spPr>
           <a:xfrm>
-            <a:off x="838200" y="1475874"/>
-            <a:ext cx="10776284" cy="4892842"/>
+            <a:off x="288758" y="1475873"/>
+            <a:ext cx="11325726" cy="5017001"/>
           </a:xfrm>
           <a:prstGeom prst="rect">
             <a:avLst/>

</xml_diff>

<commit_message>
Adding changes to the powerpoint.
</commit_message>
<xml_diff>
--- a/specifications/deliv1/SOS Deliverable 1 Presentation.pptx
+++ b/specifications/deliv1/SOS Deliverable 1 Presentation.pptx
@@ -3363,15 +3363,7 @@
           <a:p>
             <a:r>
               <a:rPr lang="en-US" dirty="0"/>
-              <a:t>Student </a:t>
-            </a:r>
-            <a:r>
-              <a:rPr lang="en-US"/>
-              <a:t>Organization System </a:t>
-            </a:r>
-            <a:r>
-              <a:rPr lang="en-US" dirty="0"/>
-              <a:t>(SOS)</a:t>
+              <a:t>Student Organization System (SOS)</a:t>
             </a:r>
           </a:p>
         </p:txBody>
@@ -3756,8 +3748,13 @@
             <a:pPr algn="ctr"/>
             <a:r>
               <a:rPr lang="en-US" dirty="0"/>
-              <a:t>Requirement Analysis SOS17</a:t>
-            </a:r>
+              <a:t>Requirement </a:t>
+            </a:r>
+            <a:r>
+              <a:rPr lang="en-US"/>
+              <a:t>Analysis SOS07</a:t>
+            </a:r>
+            <a:endParaRPr lang="en-US" dirty="0"/>
           </a:p>
         </p:txBody>
       </p:sp>

</xml_diff>

<commit_message>
Adding changes the ppt and the STARUML.
</commit_message>
<xml_diff>
--- a/specifications/deliv1/SOS Deliverable 1 Presentation.pptx
+++ b/specifications/deliv1/SOS Deliverable 1 Presentation.pptx
@@ -524,6 +524,93 @@
           <a:p>
             <a:r>
               <a:rPr lang="en-US" dirty="0"/>
+              <a:t>Risk to implement is medium since it requires web-based technology.</a:t>
+            </a:r>
+          </a:p>
+        </p:txBody>
+      </p:sp>
+      <p:sp>
+        <p:nvSpPr>
+          <p:cNvPr id="4" name="Slide Number Placeholder 3"/>
+          <p:cNvSpPr>
+            <a:spLocks noGrp="1"/>
+          </p:cNvSpPr>
+          <p:nvPr>
+            <p:ph type="sldNum" sz="quarter" idx="5"/>
+          </p:nvPr>
+        </p:nvSpPr>
+        <p:spPr/>
+        <p:txBody>
+          <a:bodyPr/>
+          <a:lstStyle/>
+          <a:p>
+            <a:fld id="{EF0E9F11-5378-4ADA-BF65-D7EDB1D950CD}" type="slidenum">
+              <a:rPr lang="en-US" smtClean="0"/>
+              <a:t>6</a:t>
+            </a:fld>
+            <a:endParaRPr lang="en-US"/>
+          </a:p>
+        </p:txBody>
+      </p:sp>
+    </p:spTree>
+    <p:extLst>
+      <p:ext uri="{BB962C8B-B14F-4D97-AF65-F5344CB8AC3E}">
+        <p14:creationId xmlns:p14="http://schemas.microsoft.com/office/powerpoint/2010/main" val="675250389"/>
+      </p:ext>
+    </p:extLst>
+  </p:cSld>
+  <p:clrMapOvr>
+    <a:masterClrMapping/>
+  </p:clrMapOvr>
+</p:notes>
+</file>
+
+<file path=ppt/notesSlides/notesSlide2.xml><?xml version="1.0" encoding="utf-8"?>
+<p:notes xmlns:a="http://schemas.openxmlformats.org/drawingml/2006/main" xmlns:r="http://schemas.openxmlformats.org/officeDocument/2006/relationships" xmlns:p="http://schemas.openxmlformats.org/presentationml/2006/main">
+  <p:cSld>
+    <p:spTree>
+      <p:nvGrpSpPr>
+        <p:cNvPr id="1" name=""/>
+        <p:cNvGrpSpPr/>
+        <p:nvPr/>
+      </p:nvGrpSpPr>
+      <p:grpSpPr>
+        <a:xfrm>
+          <a:off x="0" y="0"/>
+          <a:ext cx="0" cy="0"/>
+          <a:chOff x="0" y="0"/>
+          <a:chExt cx="0" cy="0"/>
+        </a:xfrm>
+      </p:grpSpPr>
+      <p:sp>
+        <p:nvSpPr>
+          <p:cNvPr id="2" name="Slide Image Placeholder 1"/>
+          <p:cNvSpPr>
+            <a:spLocks noGrp="1" noRot="1" noChangeAspect="1"/>
+          </p:cNvSpPr>
+          <p:nvPr>
+            <p:ph type="sldImg"/>
+          </p:nvPr>
+        </p:nvSpPr>
+        <p:spPr/>
+      </p:sp>
+      <p:sp>
+        <p:nvSpPr>
+          <p:cNvPr id="3" name="Notes Placeholder 2"/>
+          <p:cNvSpPr>
+            <a:spLocks noGrp="1"/>
+          </p:cNvSpPr>
+          <p:nvPr>
+            <p:ph type="body" idx="1"/>
+          </p:nvPr>
+        </p:nvSpPr>
+        <p:spPr/>
+        <p:txBody>
+          <a:bodyPr/>
+          <a:lstStyle/>
+          <a:p>
+            <a:r>
+              <a:rPr lang="en-US" dirty="0"/>
               <a:t>Change object diagram</a:t>
             </a:r>
           </a:p>
@@ -568,7 +655,7 @@
 </p:notes>
 </file>
 
-<file path=ppt/notesSlides/notesSlide2.xml><?xml version="1.0" encoding="utf-8"?>
+<file path=ppt/notesSlides/notesSlide3.xml><?xml version="1.0" encoding="utf-8"?>
 <p:notes xmlns:a="http://schemas.openxmlformats.org/drawingml/2006/main" xmlns:r="http://schemas.openxmlformats.org/officeDocument/2006/relationships" xmlns:p="http://schemas.openxmlformats.org/presentationml/2006/main">
   <p:cSld>
     <p:spTree>
@@ -5114,52 +5201,53 @@
         </p:nvSpPr>
         <p:spPr>
           <a:xfrm>
-            <a:off x="838199" y="1825625"/>
-            <a:ext cx="10663989" cy="4667250"/>
+            <a:off x="838200" y="1719597"/>
+            <a:ext cx="10696075" cy="5032375"/>
           </a:xfrm>
         </p:spPr>
         <p:txBody>
           <a:bodyPr>
-            <a:normAutofit lnSpcReduction="10000"/>
+            <a:normAutofit/>
           </a:bodyPr>
           <a:lstStyle/>
           <a:p>
             <a:r>
               <a:rPr lang="en-US" dirty="0"/>
-              <a:t>Provide a single point of access for all users</a:t>
+              <a:t>Provide a single point of access to all users to</a:t>
             </a:r>
           </a:p>
           <a:p>
             <a:pPr lvl="1"/>
             <a:r>
               <a:rPr lang="en-US" dirty="0"/>
-              <a:t>Collating all organizations a user belongs to.</a:t>
+              <a:t>Check all the organizations they belong to.</a:t>
             </a:r>
           </a:p>
           <a:p>
             <a:pPr lvl="1"/>
             <a:r>
               <a:rPr lang="en-US" dirty="0"/>
-              <a:t>Presenting users with events that are nearby.</a:t>
+              <a:t>Find events that are hosted nearby by organizations.</a:t>
             </a:r>
           </a:p>
           <a:p>
             <a:pPr lvl="1"/>
             <a:r>
               <a:rPr lang="en-US" dirty="0"/>
-              <a:t>Connecting users with new organizations and other members.</a:t>
-            </a:r>
-          </a:p>
-          <a:p>
+              <a:t>Discover new organizations. </a:t>
+            </a:r>
+          </a:p>
+          <a:p>
+            <a:pPr lvl="1"/>
             <a:r>
               <a:rPr lang="en-US" dirty="0"/>
-              <a:t>Organizes all members of a club under a single network.</a:t>
+              <a:t>Connect with other members.</a:t>
             </a:r>
           </a:p>
           <a:p>
             <a:r>
               <a:rPr lang="en-US" dirty="0"/>
-              <a:t>Provides tools to manage organization leader and their privileges.</a:t>
+              <a:t>Provides tools to manage organization leaders and their privileges.</a:t>
             </a:r>
           </a:p>
           <a:p>
@@ -5171,35 +5259,22 @@
           <a:p>
             <a:r>
               <a:rPr lang="en-US" dirty="0"/>
-              <a:t>Scope:</a:t>
+              <a:t>Out of Scope:</a:t>
             </a:r>
           </a:p>
           <a:p>
             <a:pPr lvl="1"/>
             <a:r>
               <a:rPr lang="en-US" dirty="0"/>
-              <a:t>University clubs and organizations.</a:t>
+              <a:t>Social Media Features (comments and postings).</a:t>
             </a:r>
           </a:p>
           <a:p>
             <a:pPr lvl="1"/>
             <a:r>
               <a:rPr lang="en-US" dirty="0"/>
-              <a:t>University students</a:t>
-            </a:r>
-          </a:p>
-          <a:p>
-            <a:pPr lvl="1"/>
-            <a:r>
-              <a:rPr lang="en-US" dirty="0"/>
-              <a:t>Monitor/administering parties.</a:t>
-            </a:r>
-          </a:p>
-          <a:p>
-            <a:pPr marL="0" indent="0">
-              <a:buNone/>
-            </a:pPr>
-            <a:endParaRPr lang="en-US" dirty="0"/>
+              <a:t>Organization finance management.</a:t>
+            </a:r>
           </a:p>
         </p:txBody>
       </p:sp>
@@ -5687,15 +5762,22 @@
             <p:ph type="title"/>
           </p:nvPr>
         </p:nvSpPr>
-        <p:spPr/>
-        <p:txBody>
-          <a:bodyPr/>
+        <p:spPr>
+          <a:xfrm>
+            <a:off x="0" y="303379"/>
+            <a:ext cx="12192000" cy="1387309"/>
+          </a:xfrm>
+        </p:spPr>
+        <p:txBody>
+          <a:bodyPr>
+            <a:normAutofit/>
+          </a:bodyPr>
           <a:lstStyle/>
           <a:p>
             <a:pPr algn="ctr"/>
             <a:r>
               <a:rPr lang="en-US" dirty="0"/>
-              <a:t>Use Case SOS16 Create Organization</a:t>
+              <a:t>SOS16 Create Organization Functional Requirements:</a:t>
             </a:r>
           </a:p>
         </p:txBody>
@@ -5716,77 +5798,85 @@
             <p:ph idx="1"/>
           </p:nvPr>
         </p:nvSpPr>
-        <p:spPr/>
-        <p:txBody>
-          <a:bodyPr/>
-          <a:lstStyle/>
-          <a:p>
+        <p:spPr>
+          <a:xfrm>
+            <a:off x="0" y="1690688"/>
+            <a:ext cx="12192000" cy="4863933"/>
+          </a:xfrm>
+        </p:spPr>
+        <p:txBody>
+          <a:bodyPr>
+            <a:normAutofit/>
+          </a:bodyPr>
+          <a:lstStyle/>
+          <a:p>
+            <a:pPr marL="457200" indent="-457200">
+              <a:buFont typeface="+mj-lt"/>
+              <a:buAutoNum type="arabicPeriod"/>
+            </a:pPr>
             <a:r>
               <a:rPr lang="en-US" dirty="0"/>
-              <a:t>Functional Requirements</a:t>
-            </a:r>
-          </a:p>
-          <a:p>
-            <a:pPr marL="457200" lvl="1" indent="0">
-              <a:buNone/>
+              <a:t>User must have an account in the webpage and logged in.</a:t>
+            </a:r>
+          </a:p>
+          <a:p>
+            <a:pPr marL="457200" indent="-457200">
+              <a:buFont typeface="+mj-lt"/>
+              <a:buAutoNum type="arabicPeriod"/>
             </a:pPr>
             <a:r>
               <a:rPr lang="en-US" dirty="0"/>
-              <a:t>1. User must have an account in the webpage and logged in.</a:t>
-            </a:r>
-          </a:p>
-          <a:p>
-            <a:pPr marL="457200" lvl="1" indent="0">
-              <a:buNone/>
+              <a:t>User clicks on “Organization Tab.”</a:t>
+            </a:r>
+          </a:p>
+          <a:p>
+            <a:pPr marL="457200" indent="-457200">
+              <a:buFont typeface="+mj-lt"/>
+              <a:buAutoNum type="arabicPeriod"/>
             </a:pPr>
             <a:r>
               <a:rPr lang="en-US" dirty="0"/>
-              <a:t>2. User clicks on “Organization Tab.”</a:t>
-            </a:r>
-          </a:p>
-          <a:p>
-            <a:pPr marL="457200" lvl="1" indent="0">
-              <a:buNone/>
+              <a:t>The webpage switches to organization page.</a:t>
+            </a:r>
+          </a:p>
+          <a:p>
+            <a:pPr marL="457200" indent="-457200">
+              <a:buFont typeface="+mj-lt"/>
+              <a:buAutoNum type="arabicPeriod"/>
             </a:pPr>
             <a:r>
               <a:rPr lang="en-US" dirty="0"/>
-              <a:t>3. The webpage switches to organization page.</a:t>
-            </a:r>
-          </a:p>
-          <a:p>
-            <a:pPr marL="457200" lvl="1" indent="0">
-              <a:buNone/>
+              <a:t>User click on “Create Organization.”</a:t>
+            </a:r>
+          </a:p>
+          <a:p>
+            <a:pPr marL="457200" indent="-457200">
+              <a:buFont typeface="+mj-lt"/>
+              <a:buAutoNum type="arabicPeriod"/>
             </a:pPr>
             <a:r>
               <a:rPr lang="en-US" dirty="0"/>
-              <a:t>4. User click on “Create Organization.”</a:t>
-            </a:r>
-          </a:p>
-          <a:p>
-            <a:pPr marL="457200" lvl="1" indent="0">
-              <a:buNone/>
+              <a:t>User then fills out form asking for the organization details.</a:t>
+            </a:r>
+          </a:p>
+          <a:p>
+            <a:pPr marL="457200" indent="-457200">
+              <a:buFont typeface="+mj-lt"/>
+              <a:buAutoNum type="arabicPeriod"/>
             </a:pPr>
             <a:r>
               <a:rPr lang="en-US" dirty="0"/>
-              <a:t>5. User then fills out form asking for the organization details.</a:t>
-            </a:r>
-          </a:p>
-          <a:p>
-            <a:pPr marL="457200" lvl="1" indent="0">
-              <a:buNone/>
+              <a:t>User submits form to the organization page.</a:t>
+            </a:r>
+          </a:p>
+          <a:p>
+            <a:pPr marL="457200" indent="-457200">
+              <a:buFont typeface="+mj-lt"/>
+              <a:buAutoNum type="arabicPeriod"/>
             </a:pPr>
             <a:r>
               <a:rPr lang="en-US" dirty="0"/>
-              <a:t>6. User submits form to webpage.</a:t>
-            </a:r>
-          </a:p>
-          <a:p>
-            <a:pPr marL="457200" lvl="1" indent="0">
-              <a:buNone/>
-            </a:pPr>
-            <a:r>
-              <a:rPr lang="en-US" dirty="0"/>
-              <a:t>7. User then sees their newly created organization on the screen and is the    leader of said organization.</a:t>
+              <a:t>User becomes Club Organizer for the organization, and it appears on the page.</a:t>
             </a:r>
           </a:p>
         </p:txBody>
@@ -5837,15 +5927,22 @@
             <p:ph type="title"/>
           </p:nvPr>
         </p:nvSpPr>
-        <p:spPr/>
-        <p:txBody>
-          <a:bodyPr/>
+        <p:spPr>
+          <a:xfrm>
+            <a:off x="0" y="365125"/>
+            <a:ext cx="12191999" cy="1325563"/>
+          </a:xfrm>
+        </p:spPr>
+        <p:txBody>
+          <a:bodyPr>
+            <a:normAutofit/>
+          </a:bodyPr>
           <a:lstStyle/>
           <a:p>
             <a:pPr algn="ctr"/>
             <a:r>
-              <a:rPr lang="en-US" dirty="0"/>
-              <a:t>Use Case SOS16 Create Organization</a:t>
+              <a:rPr lang="en-US" sz="4000" dirty="0"/>
+              <a:t>SOS16 Create Organization Nonfunctional Requirements:</a:t>
             </a:r>
           </a:p>
         </p:txBody>
@@ -5866,18 +5963,18 @@
             <p:ph idx="1"/>
           </p:nvPr>
         </p:nvSpPr>
-        <p:spPr/>
-        <p:txBody>
-          <a:bodyPr/>
-          <a:lstStyle/>
-          <a:p>
-            <a:r>
-              <a:rPr lang="en-US" dirty="0"/>
-              <a:t>Nonfunctional Requirements</a:t>
-            </a:r>
-          </a:p>
-          <a:p>
-            <a:pPr lvl="1"/>
+        <p:spPr>
+          <a:xfrm>
+            <a:off x="336885" y="1825625"/>
+            <a:ext cx="11438020" cy="4351338"/>
+          </a:xfrm>
+        </p:spPr>
+        <p:txBody>
+          <a:bodyPr>
+            <a:normAutofit lnSpcReduction="10000"/>
+          </a:bodyPr>
+          <a:lstStyle/>
+          <a:p>
             <a:r>
               <a:rPr lang="en-US" dirty="0"/>
               <a:t>Usability</a:t>
@@ -5891,7 +5988,6 @@
             </a:r>
           </a:p>
           <a:p>
-            <a:pPr lvl="1"/>
             <a:r>
               <a:rPr lang="en-US" dirty="0"/>
               <a:t>Reliability</a:t>
@@ -5905,38 +6001,42 @@
             </a:r>
           </a:p>
           <a:p>
-            <a:pPr lvl="1"/>
             <a:r>
               <a:rPr lang="en-US" dirty="0"/>
-              <a:t>Performance</a:t>
+              <a:t>Performance </a:t>
             </a:r>
           </a:p>
           <a:p>
             <a:pPr lvl="2"/>
             <a:r>
               <a:rPr lang="en-US" sz="2200" dirty="0"/>
-              <a:t>Request should be sent and saved within 6 seconds.</a:t>
+              <a:t>System should be able to handle 200 requests in 1 minute and process each in 6 sec.</a:t>
+            </a:r>
+          </a:p>
+          <a:p>
+            <a:r>
+              <a:rPr lang="en-US" sz="3000" dirty="0"/>
+              <a:t>Criticality</a:t>
             </a:r>
           </a:p>
           <a:p>
             <a:pPr lvl="2"/>
             <a:r>
               <a:rPr lang="en-US" sz="2200" dirty="0"/>
-              <a:t>System should be able to handle 200 requests in 1 minute.</a:t>
-            </a:r>
-          </a:p>
-          <a:p>
-            <a:pPr lvl="1"/>
-            <a:r>
-              <a:rPr lang="en-US" dirty="0"/>
-              <a:t>Implementation</a:t>
+              <a:t>High. Allows the user to create an organization which is a main purpose of the system.</a:t>
+            </a:r>
+          </a:p>
+          <a:p>
+            <a:r>
+              <a:rPr lang="en-US" sz="3000" dirty="0"/>
+              <a:t>Frequency:</a:t>
             </a:r>
           </a:p>
           <a:p>
             <a:pPr lvl="2"/>
             <a:r>
               <a:rPr lang="en-US" sz="2200" dirty="0"/>
-              <a:t>JS &amp; React (front end), Java and MySQL (back-end).</a:t>
+              <a:t>20 organization requests are made monthly by Users.</a:t>
             </a:r>
           </a:p>
         </p:txBody>
@@ -5987,124 +6087,144 @@
             <p:ph type="title"/>
           </p:nvPr>
         </p:nvSpPr>
+        <p:spPr>
+          <a:xfrm>
+            <a:off x="737937" y="365126"/>
+            <a:ext cx="10615863" cy="1303254"/>
+          </a:xfrm>
+        </p:spPr>
+        <p:txBody>
+          <a:bodyPr/>
+          <a:lstStyle/>
+          <a:p>
+            <a:pPr algn="ctr"/>
+            <a:r>
+              <a:rPr lang="en-US" dirty="0"/>
+              <a:t>SOS07 Edit Profile Functional Requirements:</a:t>
+            </a:r>
+          </a:p>
+        </p:txBody>
+      </p:sp>
+      <p:sp>
+        <p:nvSpPr>
+          <p:cNvPr id="3" name="Content Placeholder 2">
+            <a:extLst>
+              <a:ext uri="{FF2B5EF4-FFF2-40B4-BE49-F238E27FC236}">
+                <a16:creationId xmlns:a16="http://schemas.microsoft.com/office/drawing/2014/main" id="{74A3DC12-2B2D-4A7A-9FA0-630077C511E4}"/>
+              </a:ext>
+            </a:extLst>
+          </p:cNvPr>
+          <p:cNvSpPr>
+            <a:spLocks noGrp="1"/>
+          </p:cNvSpPr>
+          <p:nvPr>
+            <p:ph idx="1"/>
+          </p:nvPr>
+        </p:nvSpPr>
         <p:spPr/>
         <p:txBody>
-          <a:bodyPr/>
-          <a:lstStyle/>
-          <a:p>
-            <a:pPr algn="ctr"/>
+          <a:bodyPr>
+            <a:normAutofit fontScale="92500" lnSpcReduction="20000"/>
+          </a:bodyPr>
+          <a:lstStyle/>
+          <a:p>
+            <a:pPr marL="457200" indent="-457200">
+              <a:buFont typeface="+mj-lt"/>
+              <a:buAutoNum type="arabicPeriod"/>
+            </a:pPr>
             <a:r>
               <a:rPr lang="en-US" dirty="0"/>
-              <a:t>Use Case SOS07 Edit Profile (Security)</a:t>
-            </a:r>
-          </a:p>
-        </p:txBody>
-      </p:sp>
-      <p:sp>
-        <p:nvSpPr>
-          <p:cNvPr id="3" name="Content Placeholder 2">
-            <a:extLst>
-              <a:ext uri="{FF2B5EF4-FFF2-40B4-BE49-F238E27FC236}">
-                <a16:creationId xmlns:a16="http://schemas.microsoft.com/office/drawing/2014/main" id="{74A3DC12-2B2D-4A7A-9FA0-630077C511E4}"/>
-              </a:ext>
-            </a:extLst>
-          </p:cNvPr>
-          <p:cNvSpPr>
-            <a:spLocks noGrp="1"/>
-          </p:cNvSpPr>
-          <p:nvPr>
-            <p:ph idx="1"/>
-          </p:nvPr>
-        </p:nvSpPr>
-        <p:spPr/>
-        <p:txBody>
-          <a:bodyPr/>
-          <a:lstStyle/>
-          <a:p>
+              <a:t>User must have an account in the system and be logged in.</a:t>
+            </a:r>
+          </a:p>
+          <a:p>
+            <a:pPr marL="457200" indent="-457200">
+              <a:buFont typeface="+mj-lt"/>
+              <a:buAutoNum type="arabicPeriod"/>
+            </a:pPr>
             <a:r>
               <a:rPr lang="en-US" dirty="0"/>
-              <a:t>Functional Requirements:</a:t>
-            </a:r>
-          </a:p>
-          <a:p>
-            <a:pPr marL="457200" lvl="1" indent="0">
-              <a:buNone/>
+              <a:t>User is in their profile page and clicks “Edit Profile.”</a:t>
+            </a:r>
+          </a:p>
+          <a:p>
+            <a:pPr marL="457200" indent="-457200">
+              <a:buFont typeface="+mj-lt"/>
+              <a:buAutoNum type="arabicPeriod"/>
             </a:pPr>
             <a:r>
               <a:rPr lang="en-US" dirty="0"/>
-              <a:t>1. User must have an account in the system and be logged in.</a:t>
-            </a:r>
-          </a:p>
-          <a:p>
-            <a:pPr marL="457200" lvl="1" indent="0">
-              <a:buNone/>
+              <a:t>User is then shown their current information in an editable form.</a:t>
+            </a:r>
+          </a:p>
+          <a:p>
+            <a:pPr marL="457200" indent="-457200">
+              <a:buFont typeface="+mj-lt"/>
+              <a:buAutoNum type="arabicPeriod"/>
             </a:pPr>
             <a:r>
               <a:rPr lang="en-US" dirty="0"/>
-              <a:t>2. User is in their profile page and clicks “Edit Profile.”</a:t>
-            </a:r>
-          </a:p>
-          <a:p>
-            <a:pPr marL="457200" lvl="1" indent="0">
-              <a:buNone/>
+              <a:t>User inputs the data they would like to change.</a:t>
+            </a:r>
+          </a:p>
+          <a:p>
+            <a:pPr marL="457200" indent="-457200">
+              <a:buFont typeface="+mj-lt"/>
+              <a:buAutoNum type="arabicPeriod"/>
             </a:pPr>
             <a:r>
               <a:rPr lang="en-US" dirty="0"/>
-              <a:t>3. User is then shown their current information in an editable form.</a:t>
-            </a:r>
-          </a:p>
-          <a:p>
-            <a:pPr marL="457200" lvl="1" indent="0">
-              <a:buNone/>
+              <a:t>User submits the request to change their information.</a:t>
+            </a:r>
+          </a:p>
+          <a:p>
+            <a:pPr marL="457200" indent="-457200">
+              <a:buFont typeface="+mj-lt"/>
+              <a:buAutoNum type="arabicPeriod"/>
             </a:pPr>
             <a:r>
               <a:rPr lang="en-US" dirty="0"/>
-              <a:t>4. User inputs the data they would like to change.</a:t>
-            </a:r>
-          </a:p>
-          <a:p>
-            <a:pPr marL="457200" lvl="1" indent="0">
-              <a:buNone/>
+              <a:t>The webpage prompts the user for their password.</a:t>
+            </a:r>
+          </a:p>
+          <a:p>
+            <a:pPr marL="457200" indent="-457200">
+              <a:buFont typeface="+mj-lt"/>
+              <a:buAutoNum type="arabicPeriod"/>
             </a:pPr>
             <a:r>
               <a:rPr lang="en-US" dirty="0"/>
-              <a:t>5. User submits the request to change their information.</a:t>
-            </a:r>
-          </a:p>
-          <a:p>
-            <a:pPr marL="457200" lvl="1" indent="0">
-              <a:buNone/>
+              <a:t>User inputs password and submits. </a:t>
+            </a:r>
+          </a:p>
+          <a:p>
+            <a:pPr marL="457200" indent="-457200">
+              <a:buFont typeface="+mj-lt"/>
+              <a:buAutoNum type="arabicPeriod"/>
             </a:pPr>
             <a:r>
               <a:rPr lang="en-US" dirty="0"/>
-              <a:t>6. The webpage prompts the user for their password.</a:t>
-            </a:r>
-          </a:p>
-          <a:p>
-            <a:pPr marL="457200" lvl="1" indent="0">
-              <a:buNone/>
+              <a:t>System authenticates their request.</a:t>
+            </a:r>
+          </a:p>
+          <a:p>
+            <a:pPr marL="457200" indent="-457200">
+              <a:buFont typeface="+mj-lt"/>
+              <a:buAutoNum type="arabicPeriod"/>
             </a:pPr>
             <a:r>
               <a:rPr lang="en-US" dirty="0"/>
-              <a:t>7. User inputs password and submits then system authenticates their request.</a:t>
-            </a:r>
-          </a:p>
-          <a:p>
-            <a:pPr marL="457200" lvl="1" indent="0">
-              <a:buNone/>
+              <a:t>System then changes user information in the data storage.</a:t>
+            </a:r>
+          </a:p>
+          <a:p>
+            <a:pPr marL="457200" indent="-457200">
+              <a:buFont typeface="+mj-lt"/>
+              <a:buAutoNum type="arabicPeriod"/>
             </a:pPr>
             <a:r>
               <a:rPr lang="en-US" dirty="0"/>
-              <a:t>8. System then changes in the data storage.</a:t>
-            </a:r>
-          </a:p>
-          <a:p>
-            <a:pPr marL="457200" lvl="1" indent="0">
-              <a:buNone/>
-            </a:pPr>
-            <a:r>
-              <a:rPr lang="en-US" dirty="0"/>
-              <a:t>9. User receives notification that their profile has been successfully edited.</a:t>
+              <a:t>User receives notification that their profile has been successfully edited.</a:t>
             </a:r>
           </a:p>
           <a:p>
@@ -6159,108 +6279,116 @@
             <p:ph type="title"/>
           </p:nvPr>
         </p:nvSpPr>
-        <p:spPr/>
-        <p:txBody>
-          <a:bodyPr/>
-          <a:lstStyle/>
-          <a:p>
-            <a:pPr algn="ctr"/>
-            <a:r>
-              <a:rPr lang="en-US" dirty="0"/>
-              <a:t>Use Case SOS07 Edit Profile (Security)</a:t>
-            </a:r>
-          </a:p>
-        </p:txBody>
-      </p:sp>
-      <p:sp>
-        <p:nvSpPr>
-          <p:cNvPr id="3" name="Content Placeholder 2">
-            <a:extLst>
-              <a:ext uri="{FF2B5EF4-FFF2-40B4-BE49-F238E27FC236}">
-                <a16:creationId xmlns:a16="http://schemas.microsoft.com/office/drawing/2014/main" id="{20BF896D-85DA-47C5-A746-DAC19397824A}"/>
-              </a:ext>
-            </a:extLst>
-          </p:cNvPr>
-          <p:cNvSpPr>
-            <a:spLocks noGrp="1"/>
-          </p:cNvSpPr>
-          <p:nvPr>
-            <p:ph idx="1"/>
-          </p:nvPr>
-        </p:nvSpPr>
-        <p:spPr/>
+        <p:spPr>
+          <a:xfrm>
+            <a:off x="0" y="365125"/>
+            <a:ext cx="12192000" cy="1325563"/>
+          </a:xfrm>
+        </p:spPr>
         <p:txBody>
           <a:bodyPr>
             <a:normAutofit/>
           </a:bodyPr>
           <a:lstStyle/>
           <a:p>
-            <a:r>
-              <a:rPr lang="en-US" dirty="0"/>
-              <a:t>Nonfunctional Requirements</a:t>
-            </a:r>
-          </a:p>
-          <a:p>
-            <a:pPr lvl="1"/>
-            <a:r>
-              <a:rPr lang="en-US" dirty="0"/>
+            <a:pPr algn="ctr"/>
+            <a:r>
+              <a:rPr lang="en-US" sz="4000" dirty="0"/>
+              <a:t>Use Case SOS07 Edit Profile Nonfunctional Requirements:</a:t>
+            </a:r>
+          </a:p>
+        </p:txBody>
+      </p:sp>
+      <p:sp>
+        <p:nvSpPr>
+          <p:cNvPr id="3" name="Content Placeholder 2">
+            <a:extLst>
+              <a:ext uri="{FF2B5EF4-FFF2-40B4-BE49-F238E27FC236}">
+                <a16:creationId xmlns:a16="http://schemas.microsoft.com/office/drawing/2014/main" id="{20BF896D-85DA-47C5-A746-DAC19397824A}"/>
+              </a:ext>
+            </a:extLst>
+          </p:cNvPr>
+          <p:cNvSpPr>
+            <a:spLocks noGrp="1"/>
+          </p:cNvSpPr>
+          <p:nvPr>
+            <p:ph idx="1"/>
+          </p:nvPr>
+        </p:nvSpPr>
+        <p:spPr>
+          <a:xfrm>
+            <a:off x="240631" y="1825624"/>
+            <a:ext cx="11758863" cy="5032376"/>
+          </a:xfrm>
+        </p:spPr>
+        <p:txBody>
+          <a:bodyPr>
+            <a:normAutofit lnSpcReduction="10000"/>
+          </a:bodyPr>
+          <a:lstStyle/>
+          <a:p>
+            <a:r>
+              <a:rPr lang="en-US" sz="2400" dirty="0"/>
               <a:t>Usability</a:t>
             </a:r>
           </a:p>
           <a:p>
             <a:pPr lvl="2"/>
             <a:r>
-              <a:rPr lang="en-US" dirty="0"/>
+              <a:rPr lang="en-US" sz="2400" dirty="0"/>
               <a:t>User must be aware of their privileges and what actions those privileges permit.</a:t>
             </a:r>
           </a:p>
           <a:p>
-            <a:pPr lvl="1"/>
-            <a:r>
-              <a:rPr lang="en-US" dirty="0"/>
-              <a:t>Availability</a:t>
+            <a:r>
+              <a:rPr lang="en-US" sz="2400" dirty="0"/>
+              <a:t>Reliability</a:t>
             </a:r>
           </a:p>
           <a:p>
             <a:pPr lvl="2"/>
             <a:r>
-              <a:rPr lang="en-US" dirty="0"/>
-              <a:t>Downtime for Login Back-up – 30 minutes in a 24-hour period.</a:t>
-            </a:r>
-          </a:p>
-          <a:p>
-            <a:pPr lvl="1"/>
-            <a:r>
-              <a:rPr lang="en-US" dirty="0"/>
+              <a:rPr lang="en-US" sz="2400" dirty="0"/>
+              <a:t>Mean Time to Failure – 1% failure yearly is acceptable.</a:t>
+            </a:r>
+          </a:p>
+          <a:p>
+            <a:r>
+              <a:rPr lang="en-US" sz="2400" dirty="0"/>
               <a:t>Performance</a:t>
             </a:r>
           </a:p>
           <a:p>
             <a:pPr lvl="2"/>
             <a:r>
-              <a:rPr lang="en-US" dirty="0"/>
-              <a:t>The system should handle 20 privilege checks in 1 minute.</a:t>
+              <a:rPr lang="en-US" sz="2400" dirty="0"/>
+              <a:t>The system should handle 20 privilege checks in 1 minute and process each ~2 seconds.</a:t>
+            </a:r>
+          </a:p>
+          <a:p>
+            <a:r>
+              <a:rPr lang="en-US" sz="2400" dirty="0"/>
+              <a:t>Criticality</a:t>
             </a:r>
           </a:p>
           <a:p>
             <a:pPr lvl="2"/>
             <a:r>
-              <a:rPr lang="en-US" dirty="0"/>
-              <a:t>The system should be done with the edit request within 2 seconds.</a:t>
-            </a:r>
-          </a:p>
-          <a:p>
-            <a:pPr lvl="1"/>
-            <a:r>
-              <a:rPr lang="en-US" dirty="0"/>
-              <a:t>Supportability</a:t>
+              <a:rPr lang="en-US" sz="2400" dirty="0"/>
+              <a:t>Low. Editing the user’s profile is a secondary feature of the system.</a:t>
+            </a:r>
+          </a:p>
+          <a:p>
+            <a:r>
+              <a:rPr lang="en-US" sz="2400" dirty="0"/>
+              <a:t>Frequency:</a:t>
             </a:r>
           </a:p>
           <a:p>
             <a:pPr lvl="2"/>
             <a:r>
-              <a:rPr lang="en-US" dirty="0"/>
-              <a:t>Should be supported by all browsers.</a:t>
+              <a:rPr lang="en-US" sz="2400" dirty="0"/>
+              <a:t>On average 20 users will edit their profile settings on a given month.</a:t>
             </a:r>
             <a:br>
               <a:rPr lang="en-US" dirty="0"/>
@@ -6271,7 +6399,7 @@
             <a:endParaRPr lang="en-US" dirty="0"/>
           </a:p>
           <a:p>
-            <a:endParaRPr lang="en-US" dirty="0"/>
+            <a:endParaRPr lang="en-US" sz="2000" dirty="0"/>
           </a:p>
         </p:txBody>
       </p:sp>

</xml_diff>

<commit_message>
final changes to pttx
</commit_message>
<xml_diff>
--- a/specifications/deliv1/SOS Deliverable 1 Presentation.pptx
+++ b/specifications/deliv1/SOS Deliverable 1 Presentation.pptx
@@ -5,7 +5,7 @@
     <p:sldMasterId id="2147483660" r:id="rId1"/>
   </p:sldMasterIdLst>
   <p:notesMasterIdLst>
-    <p:notesMasterId r:id="rId18"/>
+    <p:notesMasterId r:id="rId17"/>
   </p:notesMasterIdLst>
   <p:sldIdLst>
     <p:sldId id="256" r:id="rId2"/>
@@ -17,13 +17,12 @@
     <p:sldId id="262" r:id="rId8"/>
     <p:sldId id="263" r:id="rId9"/>
     <p:sldId id="264" r:id="rId10"/>
-    <p:sldId id="273" r:id="rId11"/>
-    <p:sldId id="271" r:id="rId12"/>
-    <p:sldId id="266" r:id="rId13"/>
-    <p:sldId id="267" r:id="rId14"/>
-    <p:sldId id="268" r:id="rId15"/>
-    <p:sldId id="269" r:id="rId16"/>
-    <p:sldId id="270" r:id="rId17"/>
+    <p:sldId id="271" r:id="rId11"/>
+    <p:sldId id="266" r:id="rId12"/>
+    <p:sldId id="267" r:id="rId13"/>
+    <p:sldId id="268" r:id="rId14"/>
+    <p:sldId id="269" r:id="rId15"/>
+    <p:sldId id="270" r:id="rId16"/>
   </p:sldIdLst>
   <p:sldSz cx="12192000" cy="6858000"/>
   <p:notesSz cx="6858000" cy="9144000"/>
@@ -9722,7 +9721,7 @@
           <a:p>
             <a:fld id="{EF0E9F11-5378-4ADA-BF65-D7EDB1D950CD}" type="slidenum">
               <a:rPr lang="en-US" smtClean="0"/>
-              <a:t>13</a:t>
+              <a:t>12</a:t>
             </a:fld>
             <a:endParaRPr lang="en-US"/>
           </a:p>
@@ -9812,7 +9811,7 @@
           <a:p>
             <a:fld id="{EF0E9F11-5378-4ADA-BF65-D7EDB1D950CD}" type="slidenum">
               <a:rPr lang="en-US" smtClean="0"/>
-              <a:t>15</a:t>
+              <a:t>14</a:t>
             </a:fld>
             <a:endParaRPr lang="en-US"/>
           </a:p>
@@ -9899,7 +9898,7 @@
           <a:p>
             <a:fld id="{EF0E9F11-5378-4ADA-BF65-D7EDB1D950CD}" type="slidenum">
               <a:rPr lang="en-US" smtClean="0"/>
-              <a:t>16</a:t>
+              <a:t>15</a:t>
             </a:fld>
             <a:endParaRPr lang="en-US"/>
           </a:p>
@@ -16104,283 +16103,6 @@
           <p:cNvPr id="2" name="Title 1">
             <a:extLst>
               <a:ext uri="{FF2B5EF4-FFF2-40B4-BE49-F238E27FC236}">
-                <a16:creationId xmlns:a16="http://schemas.microsoft.com/office/drawing/2014/main" id="{0666A077-B6FB-4817-9FCE-F0B9734ADCFA}"/>
-              </a:ext>
-            </a:extLst>
-          </p:cNvPr>
-          <p:cNvSpPr>
-            <a:spLocks noGrp="1"/>
-          </p:cNvSpPr>
-          <p:nvPr>
-            <p:ph type="title"/>
-          </p:nvPr>
-        </p:nvSpPr>
-        <p:spPr>
-          <a:xfrm>
-            <a:off x="526073" y="361016"/>
-            <a:ext cx="11139854" cy="930447"/>
-          </a:xfrm>
-        </p:spPr>
-        <p:txBody>
-          <a:bodyPr vert="horz" lIns="91440" tIns="45720" rIns="91440" bIns="45720" rtlCol="0" anchor="b">
-            <a:normAutofit/>
-          </a:bodyPr>
-          <a:lstStyle/>
-          <a:p>
-            <a:pPr algn="ctr"/>
-            <a:r>
-              <a:rPr lang="en-US" dirty="0">
-                <a:solidFill>
-                  <a:srgbClr val="FFFFFF"/>
-                </a:solidFill>
-              </a:rPr>
-              <a:t>User Interface Design SOS16</a:t>
-            </a:r>
-          </a:p>
-        </p:txBody>
-      </p:sp>
-      <p:pic>
-        <p:nvPicPr>
-          <p:cNvPr id="5" name="Content Placeholder 4" descr="A screenshot of a computer&#10;&#10;Description automatically generated">
-            <a:extLst>
-              <a:ext uri="{FF2B5EF4-FFF2-40B4-BE49-F238E27FC236}">
-                <a16:creationId xmlns:a16="http://schemas.microsoft.com/office/drawing/2014/main" id="{A906F036-35FF-4D3A-A731-68820BB65DDE}"/>
-              </a:ext>
-            </a:extLst>
-          </p:cNvPr>
-          <p:cNvPicPr>
-            <a:picLocks noGrp="1" noChangeAspect="1"/>
-          </p:cNvPicPr>
-          <p:nvPr>
-            <p:ph idx="1"/>
-          </p:nvPr>
-        </p:nvPicPr>
-        <p:blipFill rotWithShape="1">
-          <a:blip r:embed="rId2">
-            <a:extLst>
-              <a:ext uri="{28A0092B-C50C-407E-A947-70E740481C1C}">
-                <a14:useLocalDpi xmlns:a14="http://schemas.microsoft.com/office/drawing/2010/main" val="0"/>
-              </a:ext>
-            </a:extLst>
-          </a:blip>
-          <a:srcRect l="15990" t="25942" r="16582" b="7559"/>
-          <a:stretch/>
-        </p:blipFill>
-        <p:spPr>
-          <a:xfrm>
-            <a:off x="913795" y="1623358"/>
-            <a:ext cx="6498120" cy="3604846"/>
-          </a:xfrm>
-          <a:prstGeom prst="rect">
-            <a:avLst/>
-          </a:prstGeom>
-        </p:spPr>
-      </p:pic>
-      <p:pic>
-        <p:nvPicPr>
-          <p:cNvPr id="7" name="Picture 6" descr="A screenshot of a social media post&#10;&#10;Description automatically generated">
-            <a:extLst>
-              <a:ext uri="{FF2B5EF4-FFF2-40B4-BE49-F238E27FC236}">
-                <a16:creationId xmlns:a16="http://schemas.microsoft.com/office/drawing/2014/main" id="{946776CE-C8BE-43FC-8407-ADA4DF10BB23}"/>
-              </a:ext>
-            </a:extLst>
-          </p:cNvPr>
-          <p:cNvPicPr>
-            <a:picLocks noChangeAspect="1"/>
-          </p:cNvPicPr>
-          <p:nvPr/>
-        </p:nvPicPr>
-        <p:blipFill rotWithShape="1">
-          <a:blip r:embed="rId3">
-            <a:extLst>
-              <a:ext uri="{28A0092B-C50C-407E-A947-70E740481C1C}">
-                <a14:useLocalDpi xmlns:a14="http://schemas.microsoft.com/office/drawing/2010/main" val="0"/>
-              </a:ext>
-            </a:extLst>
-          </a:blip>
-          <a:srcRect l="24292" t="21927" r="49985" b="9317"/>
-          <a:stretch/>
-        </p:blipFill>
-        <p:spPr>
-          <a:xfrm>
-            <a:off x="8191506" y="1291463"/>
-            <a:ext cx="2699277" cy="4058426"/>
-          </a:xfrm>
-          <a:prstGeom prst="rect">
-            <a:avLst/>
-          </a:prstGeom>
-        </p:spPr>
-      </p:pic>
-      <p:sp>
-        <p:nvSpPr>
-          <p:cNvPr id="6" name="Footer Placeholder 5">
-            <a:extLst>
-              <a:ext uri="{FF2B5EF4-FFF2-40B4-BE49-F238E27FC236}">
-                <a16:creationId xmlns:a16="http://schemas.microsoft.com/office/drawing/2014/main" id="{C030A3F1-24D3-419B-81B8-1987ED900FFB}"/>
-              </a:ext>
-            </a:extLst>
-          </p:cNvPr>
-          <p:cNvSpPr>
-            <a:spLocks noGrp="1"/>
-          </p:cNvSpPr>
-          <p:nvPr>
-            <p:ph type="ftr" sz="quarter" idx="11"/>
-          </p:nvPr>
-        </p:nvSpPr>
-        <p:spPr/>
-        <p:txBody>
-          <a:bodyPr/>
-          <a:lstStyle/>
-          <a:p>
-            <a:r>
-              <a:rPr lang="en-US"/>
-              <a:t>Student Organization System - Software Requirements Document</a:t>
-            </a:r>
-          </a:p>
-        </p:txBody>
-      </p:sp>
-      <p:sp>
-        <p:nvSpPr>
-          <p:cNvPr id="8" name="Slide Number Placeholder 7">
-            <a:extLst>
-              <a:ext uri="{FF2B5EF4-FFF2-40B4-BE49-F238E27FC236}">
-                <a16:creationId xmlns:a16="http://schemas.microsoft.com/office/drawing/2014/main" id="{E2EC5D1F-EB62-4030-AFB3-F8EE8D42F46F}"/>
-              </a:ext>
-            </a:extLst>
-          </p:cNvPr>
-          <p:cNvSpPr>
-            <a:spLocks noGrp="1"/>
-          </p:cNvSpPr>
-          <p:nvPr>
-            <p:ph type="sldNum" sz="quarter" idx="12"/>
-          </p:nvPr>
-        </p:nvSpPr>
-        <p:spPr/>
-        <p:txBody>
-          <a:bodyPr/>
-          <a:lstStyle/>
-          <a:p>
-            <a:fld id="{5FB0F42B-CAA9-4D4F-86CF-07230423CC99}" type="slidenum">
-              <a:rPr lang="en-US" smtClean="0"/>
-              <a:t>10</a:t>
-            </a:fld>
-            <a:endParaRPr lang="en-US"/>
-          </a:p>
-        </p:txBody>
-      </p:sp>
-      <p:sp>
-        <p:nvSpPr>
-          <p:cNvPr id="9" name="TextBox 8">
-            <a:extLst>
-              <a:ext uri="{FF2B5EF4-FFF2-40B4-BE49-F238E27FC236}">
-                <a16:creationId xmlns:a16="http://schemas.microsoft.com/office/drawing/2014/main" id="{279EC8C1-3D7B-4800-ADC3-7C5D524F541F}"/>
-              </a:ext>
-            </a:extLst>
-          </p:cNvPr>
-          <p:cNvSpPr txBox="1"/>
-          <p:nvPr/>
-        </p:nvSpPr>
-        <p:spPr>
-          <a:xfrm>
-            <a:off x="1054774" y="5261966"/>
-            <a:ext cx="6216162" cy="369332"/>
-          </a:xfrm>
-          <a:prstGeom prst="rect">
-            <a:avLst/>
-          </a:prstGeom>
-          <a:noFill/>
-        </p:spPr>
-        <p:txBody>
-          <a:bodyPr wrap="square" rtlCol="0">
-            <a:spAutoFit/>
-          </a:bodyPr>
-          <a:lstStyle/>
-          <a:p>
-            <a:r>
-              <a:rPr lang="en-US" i="1" dirty="0"/>
-              <a:t>New Organization Form for SOS16 Scenario</a:t>
-            </a:r>
-          </a:p>
-        </p:txBody>
-      </p:sp>
-      <p:sp>
-        <p:nvSpPr>
-          <p:cNvPr id="10" name="TextBox 9">
-            <a:extLst>
-              <a:ext uri="{FF2B5EF4-FFF2-40B4-BE49-F238E27FC236}">
-                <a16:creationId xmlns:a16="http://schemas.microsoft.com/office/drawing/2014/main" id="{C2271CC5-0F51-4FE5-99E1-B73428DA9C90}"/>
-              </a:ext>
-            </a:extLst>
-          </p:cNvPr>
-          <p:cNvSpPr txBox="1"/>
-          <p:nvPr/>
-        </p:nvSpPr>
-        <p:spPr>
-          <a:xfrm>
-            <a:off x="8191506" y="5374858"/>
-            <a:ext cx="2699277" cy="369332"/>
-          </a:xfrm>
-          <a:prstGeom prst="rect">
-            <a:avLst/>
-          </a:prstGeom>
-          <a:noFill/>
-        </p:spPr>
-        <p:txBody>
-          <a:bodyPr wrap="square" rtlCol="0">
-            <a:spAutoFit/>
-          </a:bodyPr>
-          <a:lstStyle/>
-          <a:p>
-            <a:r>
-              <a:rPr lang="en-US" i="1" dirty="0"/>
-              <a:t>Resulting Organization</a:t>
-            </a:r>
-          </a:p>
-        </p:txBody>
-      </p:sp>
-    </p:spTree>
-    <p:extLst>
-      <p:ext uri="{BB962C8B-B14F-4D97-AF65-F5344CB8AC3E}">
-        <p14:creationId xmlns:p14="http://schemas.microsoft.com/office/powerpoint/2010/main" val="2307572880"/>
-      </p:ext>
-    </p:extLst>
-  </p:cSld>
-  <p:clrMapOvr>
-    <a:masterClrMapping/>
-  </p:clrMapOvr>
-</p:sld>
-</file>
-
-<file path=ppt/slides/slide11.xml><?xml version="1.0" encoding="utf-8"?>
-<p:sld xmlns:a="http://schemas.openxmlformats.org/drawingml/2006/main" xmlns:r="http://schemas.openxmlformats.org/officeDocument/2006/relationships" xmlns:p="http://schemas.openxmlformats.org/presentationml/2006/main">
-  <p:cSld>
-    <p:bg>
-      <p:bgPr>
-        <a:solidFill>
-          <a:schemeClr val="bg1"/>
-        </a:solidFill>
-        <a:effectLst/>
-      </p:bgPr>
-    </p:bg>
-    <p:spTree>
-      <p:nvGrpSpPr>
-        <p:cNvPr id="1" name=""/>
-        <p:cNvGrpSpPr/>
-        <p:nvPr/>
-      </p:nvGrpSpPr>
-      <p:grpSpPr>
-        <a:xfrm>
-          <a:off x="0" y="0"/>
-          <a:ext cx="0" cy="0"/>
-          <a:chOff x="0" y="0"/>
-          <a:chExt cx="0" cy="0"/>
-        </a:xfrm>
-      </p:grpSpPr>
-      <p:sp>
-        <p:nvSpPr>
-          <p:cNvPr id="2" name="Title 1">
-            <a:extLst>
-              <a:ext uri="{FF2B5EF4-FFF2-40B4-BE49-F238E27FC236}">
                 <a16:creationId xmlns:a16="http://schemas.microsoft.com/office/drawing/2014/main" id="{02E6FE26-F133-4E4B-AECF-BBE8599EC259}"/>
               </a:ext>
             </a:extLst>
@@ -16489,7 +16211,7 @@
           <a:p>
             <a:fld id="{5FB0F42B-CAA9-4D4F-86CF-07230423CC99}" type="slidenum">
               <a:rPr lang="en-US" smtClean="0"/>
-              <a:t>11</a:t>
+              <a:t>10</a:t>
             </a:fld>
             <a:endParaRPr lang="en-US"/>
           </a:p>
@@ -16860,7 +16582,7 @@
 </p:sld>
 </file>
 
-<file path=ppt/slides/slide12.xml><?xml version="1.0" encoding="utf-8"?>
+<file path=ppt/slides/slide11.xml><?xml version="1.0" encoding="utf-8"?>
 <p:sld xmlns:a="http://schemas.openxmlformats.org/drawingml/2006/main" xmlns:r="http://schemas.openxmlformats.org/officeDocument/2006/relationships" xmlns:p="http://schemas.openxmlformats.org/presentationml/2006/main">
   <p:cSld>
     <p:bg>
@@ -17030,7 +16752,7 @@
           <a:p>
             <a:fld id="{5FB0F42B-CAA9-4D4F-86CF-07230423CC99}" type="slidenum">
               <a:rPr lang="en-US" smtClean="0"/>
-              <a:t>12</a:t>
+              <a:t>11</a:t>
             </a:fld>
             <a:endParaRPr lang="en-US"/>
           </a:p>
@@ -17049,7 +16771,7 @@
 </p:sld>
 </file>
 
-<file path=ppt/slides/slide13.xml><?xml version="1.0" encoding="utf-8"?>
+<file path=ppt/slides/slide12.xml><?xml version="1.0" encoding="utf-8"?>
 <p:sld xmlns:a="http://schemas.openxmlformats.org/drawingml/2006/main" xmlns:r="http://schemas.openxmlformats.org/officeDocument/2006/relationships" xmlns:p="http://schemas.openxmlformats.org/presentationml/2006/main">
   <p:cSld>
     <p:bg>
@@ -17236,7 +16958,7 @@
           <a:p>
             <a:fld id="{5FB0F42B-CAA9-4D4F-86CF-07230423CC99}" type="slidenum">
               <a:rPr lang="en-US" smtClean="0"/>
-              <a:t>13</a:t>
+              <a:t>12</a:t>
             </a:fld>
             <a:endParaRPr lang="en-US"/>
           </a:p>
@@ -17255,7 +16977,7 @@
 </p:sld>
 </file>
 
-<file path=ppt/slides/slide14.xml><?xml version="1.0" encoding="utf-8"?>
+<file path=ppt/slides/slide13.xml><?xml version="1.0" encoding="utf-8"?>
 <p:sld xmlns:a="http://schemas.openxmlformats.org/drawingml/2006/main" xmlns:r="http://schemas.openxmlformats.org/officeDocument/2006/relationships" xmlns:p="http://schemas.openxmlformats.org/presentationml/2006/main">
   <p:cSld>
     <p:bg>
@@ -17396,7 +17118,7 @@
           <a:p>
             <a:fld id="{5FB0F42B-CAA9-4D4F-86CF-07230423CC99}" type="slidenum">
               <a:rPr lang="en-US" smtClean="0"/>
-              <a:t>14</a:t>
+              <a:t>13</a:t>
             </a:fld>
             <a:endParaRPr lang="en-US"/>
           </a:p>
@@ -17415,7 +17137,7 @@
 </p:sld>
 </file>
 
-<file path=ppt/slides/slide15.xml><?xml version="1.0" encoding="utf-8"?>
+<file path=ppt/slides/slide14.xml><?xml version="1.0" encoding="utf-8"?>
 <p:sld xmlns:a="http://schemas.openxmlformats.org/drawingml/2006/main" xmlns:r="http://schemas.openxmlformats.org/officeDocument/2006/relationships" xmlns:p="http://schemas.openxmlformats.org/presentationml/2006/main">
   <p:cSld>
     <p:bg>
@@ -17557,7 +17279,7 @@
           <a:p>
             <a:fld id="{5FB0F42B-CAA9-4D4F-86CF-07230423CC99}" type="slidenum">
               <a:rPr lang="en-US" smtClean="0"/>
-              <a:t>15</a:t>
+              <a:t>14</a:t>
             </a:fld>
             <a:endParaRPr lang="en-US"/>
           </a:p>
@@ -17576,7 +17298,7 @@
 </p:sld>
 </file>
 
-<file path=ppt/slides/slide16.xml><?xml version="1.0" encoding="utf-8"?>
+<file path=ppt/slides/slide15.xml><?xml version="1.0" encoding="utf-8"?>
 <p:sld xmlns:a="http://schemas.openxmlformats.org/drawingml/2006/main" xmlns:r="http://schemas.openxmlformats.org/officeDocument/2006/relationships" xmlns:p="http://schemas.openxmlformats.org/presentationml/2006/main">
   <p:cSld>
     <p:spTree>

</xml_diff>

<commit_message>
Adding database backups. Added tables in ER Diagram and started working on stored procedures.
</commit_message>
<xml_diff>
--- a/specifications/deliv1/SOS Deliverable 1 Presentation.pptx
+++ b/specifications/deliv1/SOS Deliverable 1 Presentation.pptx
@@ -15946,14 +15946,14 @@
         </p:nvSpPr>
         <p:spPr>
           <a:xfrm>
-            <a:off x="4429917" y="3598341"/>
-            <a:ext cx="3321586" cy="2098435"/>
+            <a:off x="3628007" y="3591683"/>
+            <a:ext cx="4935985" cy="2812002"/>
           </a:xfrm>
           <a:effectLst/>
         </p:spPr>
         <p:txBody>
           <a:bodyPr anchor="ctr">
-            <a:normAutofit fontScale="32500" lnSpcReduction="20000"/>
+            <a:normAutofit fontScale="40000" lnSpcReduction="20000"/>
           </a:bodyPr>
           <a:lstStyle/>
           <a:p>
@@ -15963,7 +15963,7 @@
               </a:lnSpc>
             </a:pPr>
             <a:r>
-              <a:rPr lang="en-US" sz="4000" dirty="0"/>
+              <a:rPr lang="en-US" sz="5600" dirty="0"/>
               <a:t>Armando J. Ochoa – Primary Facilitator</a:t>
             </a:r>
           </a:p>
@@ -15974,11 +15974,11 @@
               </a:lnSpc>
             </a:pPr>
             <a:r>
-              <a:rPr lang="en-US" sz="4000" dirty="0" err="1"/>
+              <a:rPr lang="en-US" sz="5600" dirty="0" err="1"/>
               <a:t>Yovanni</a:t>
             </a:r>
             <a:r>
-              <a:rPr lang="en-US" sz="4000" dirty="0"/>
+              <a:rPr lang="en-US" sz="5600" dirty="0"/>
               <a:t> Jones – Developer</a:t>
             </a:r>
           </a:p>
@@ -15989,15 +15989,15 @@
               </a:lnSpc>
             </a:pPr>
             <a:r>
-              <a:rPr lang="en-US" sz="4000" dirty="0"/>
+              <a:rPr lang="en-US" sz="5600" dirty="0"/>
               <a:t>Anthony Sanchez-</a:t>
             </a:r>
             <a:r>
-              <a:rPr lang="en-US" sz="4000" dirty="0" err="1"/>
+              <a:rPr lang="en-US" sz="5600" dirty="0" err="1"/>
               <a:t>Ayra</a:t>
             </a:r>
             <a:r>
-              <a:rPr lang="en-US" sz="4000" dirty="0"/>
+              <a:rPr lang="en-US" sz="5600" dirty="0"/>
               <a:t> – Team Leader</a:t>
             </a:r>
           </a:p>
@@ -16008,11 +16008,11 @@
               </a:lnSpc>
             </a:pPr>
             <a:r>
-              <a:rPr lang="en-US" sz="4000" dirty="0" err="1"/>
+              <a:rPr lang="en-US" sz="5600" dirty="0" err="1"/>
               <a:t>Teriq</a:t>
             </a:r>
             <a:r>
-              <a:rPr lang="en-US" sz="4000" dirty="0"/>
+              <a:rPr lang="en-US" sz="5600" dirty="0"/>
               <a:t> Douglas – Minute Taker</a:t>
             </a:r>
           </a:p>
@@ -16023,19 +16023,19 @@
               </a:lnSpc>
             </a:pPr>
             <a:r>
-              <a:rPr lang="en-US" sz="4000" dirty="0" err="1"/>
+              <a:rPr lang="en-US" sz="5600" dirty="0" err="1"/>
               <a:t>M.Kian</a:t>
             </a:r>
             <a:r>
-              <a:rPr lang="en-US" sz="4000" dirty="0"/>
+              <a:rPr lang="en-US" sz="5600" dirty="0"/>
               <a:t> </a:t>
             </a:r>
             <a:r>
-              <a:rPr lang="en-US" sz="4000" dirty="0" err="1"/>
+              <a:rPr lang="en-US" sz="5600" dirty="0" err="1"/>
               <a:t>Maroofi</a:t>
             </a:r>
             <a:r>
-              <a:rPr lang="en-US" sz="4000" dirty="0"/>
+              <a:rPr lang="en-US" sz="5600" dirty="0"/>
               <a:t> – Time Keeper</a:t>
             </a:r>
           </a:p>
@@ -16046,7 +16046,7 @@
               </a:lnSpc>
             </a:pPr>
             <a:r>
-              <a:rPr lang="en-US" sz="4000" dirty="0"/>
+              <a:rPr lang="en-US" sz="5600" dirty="0"/>
               <a:t>Date: 10/01/2019</a:t>
             </a:r>
           </a:p>
@@ -17431,7 +17431,6 @@
                 <a:tint val="98000"/>
               </a:schemeClr>
             </a:duotone>
-            <a:extLst/>
           </a:blip>
           <a:stretch/>
         </a:blipFill>
@@ -18166,7 +18165,6 @@
                 <a:tint val="98000"/>
               </a:schemeClr>
             </a:duotone>
-            <a:extLst/>
           </a:blip>
           <a:stretch/>
         </a:blipFill>
@@ -18495,7 +18493,6 @@
                 <a:tint val="98000"/>
               </a:schemeClr>
             </a:duotone>
-            <a:extLst/>
           </a:blip>
           <a:stretch/>
         </a:blipFill>
@@ -18917,7 +18914,6 @@
                 <a:tint val="98000"/>
               </a:schemeClr>
             </a:duotone>
-            <a:extLst/>
           </a:blip>
           <a:stretch/>
         </a:blipFill>
@@ -19364,7 +19360,6 @@
                 <a:tint val="98000"/>
               </a:schemeClr>
             </a:duotone>
-            <a:extLst/>
           </a:blip>
           <a:stretch/>
         </a:blipFill>
@@ -19596,7 +19591,7 @@
             </a:pPr>
             <a:r>
               <a:rPr lang="en-US" sz="2200" dirty="0"/>
-              <a:t>User  is logged in.</a:t>
+              <a:t>User is logged in.</a:t>
             </a:r>
           </a:p>
           <a:p>
@@ -19820,7 +19815,6 @@
                 <a:tint val="98000"/>
               </a:schemeClr>
             </a:duotone>
-            <a:extLst/>
           </a:blip>
           <a:stretch/>
         </a:blipFill>

</xml_diff>